<commit_message>
Bổ xung bt chương 14, 15
</commit_message>
<xml_diff>
--- a/Bai 14 Phan lop van ban_p1.pptx
+++ b/Bai 14 Phan lop van ban_p1.pptx
@@ -5,7 +5,7 @@
     <p:sldMasterId id="2147483652" r:id="rId1"/>
   </p:sldMasterIdLst>
   <p:notesMasterIdLst>
-    <p:notesMasterId r:id="rId31"/>
+    <p:notesMasterId r:id="rId33"/>
   </p:notesMasterIdLst>
   <p:sldIdLst>
     <p:sldId id="313" r:id="rId2"/>
@@ -27,8 +27,8 @@
     <p:sldId id="515" r:id="rId18"/>
     <p:sldId id="516" r:id="rId19"/>
     <p:sldId id="517" r:id="rId20"/>
-    <p:sldId id="529" r:id="rId21"/>
-    <p:sldId id="532" r:id="rId22"/>
+    <p:sldId id="532" r:id="rId21"/>
+    <p:sldId id="529" r:id="rId22"/>
     <p:sldId id="530" r:id="rId23"/>
     <p:sldId id="525" r:id="rId24"/>
     <p:sldId id="519" r:id="rId25"/>
@@ -36,7 +36,9 @@
     <p:sldId id="521" r:id="rId27"/>
     <p:sldId id="522" r:id="rId28"/>
     <p:sldId id="531" r:id="rId29"/>
-    <p:sldId id="418" r:id="rId30"/>
+    <p:sldId id="533" r:id="rId30"/>
+    <p:sldId id="534" r:id="rId31"/>
+    <p:sldId id="418" r:id="rId32"/>
   </p:sldIdLst>
   <p:sldSz cx="9144000" cy="6858000" type="screen4x3"/>
   <p:notesSz cx="6858000" cy="9144000"/>
@@ -9718,14 +9720,6 @@
                 </a:r>
                 <a:r>
                   <a:rPr lang="en-US" sz="2800" smtClean="0"/>
-                  <a:t> </a:t>
-                </a:r>
-                <a:r>
-                  <a:rPr lang="en-US" sz="2800" err="1" smtClean="0"/>
-                  <a:t>với</a:t>
-                </a:r>
-                <a:r>
-                  <a:rPr lang="en-US" sz="2800" smtClean="0"/>
                   <a:t> có </a:t>
                 </a:r>
                 <a:r>
@@ -9742,15 +9736,7 @@
                 </a:r>
                 <a:r>
                   <a:rPr lang="en-US" sz="2800" smtClean="0"/>
-                  <a:t> </a:t>
-                </a:r>
-                <a:r>
-                  <a:rPr lang="en-US" sz="2800" err="1" smtClean="0"/>
-                  <a:t>cao</a:t>
-                </a:r>
-                <a:r>
-                  <a:rPr lang="en-US" sz="2800" smtClean="0"/>
-                  <a:t> </a:t>
+                  <a:t> thuộc cao </a:t>
                 </a:r>
                 <a:r>
                   <a:rPr lang="en-US" sz="2800" err="1" smtClean="0"/>
@@ -10111,7 +10097,7 @@
                 </a:pPr>
                 <a:r>
                   <a:rPr lang="vi-VN" sz="2800" smtClean="0"/>
-                  <a:t>Lớp với xác suất lớn nhất không đổi nếu sử dụng logarithm</a:t>
+                  <a:t>Kết quả phân lớp không đổi nếu sử dụng logarithm</a:t>
                 </a:r>
               </a:p>
               <a:p>
@@ -12496,8 +12482,8 @@
         </p:nvSpPr>
         <p:spPr bwMode="auto">
           <a:xfrm>
-            <a:off x="1121130" y="303213"/>
-            <a:ext cx="7742664" cy="1403350"/>
+            <a:off x="1187623" y="303213"/>
+            <a:ext cx="7629705" cy="1403350"/>
           </a:xfrm>
           <a:prstGeom prst="rect">
             <a:avLst/>
@@ -12543,8 +12529,11 @@
             </a:prstTxWarp>
           </a:bodyPr>
           <a:lstStyle>
+            <a:defPPr>
+              <a:defRPr lang="vi-VN"/>
+            </a:defPPr>
             <a:lvl1pPr eaLnBrk="1" hangingPunct="1">
-              <a:defRPr sz="3600">
+              <a:defRPr sz="3600" b="0">
                 <a:solidFill>
                   <a:schemeClr val="tx2"/>
                 </a:solidFill>
@@ -12636,10 +12625,18 @@
           </a:lstStyle>
           <a:p>
             <a:r>
-              <a:rPr lang="vi-VN" b="0" smtClean="0"/>
-              <a:t>Bài tập</a:t>
-            </a:r>
-            <a:endParaRPr lang="vi-VN" b="0"/>
+              <a:rPr lang="en-US" smtClean="0"/>
+              <a:t>Độ phức tạp của </a:t>
+            </a:r>
+            <a:r>
+              <a:rPr lang="en-US"/>
+              <a:t>Naive </a:t>
+            </a:r>
+            <a:r>
+              <a:rPr lang="en-US" err="1"/>
+              <a:t>Bayes</a:t>
+            </a:r>
+            <a:endParaRPr lang="en-US"/>
           </a:p>
         </p:txBody>
       </p:sp>
@@ -12683,30 +12680,6 @@
           </a:p>
         </p:txBody>
       </p:sp>
-      <p:pic>
-        <p:nvPicPr>
-          <p:cNvPr id="8" name="Picture 7" descr="1335.png"/>
-          <p:cNvPicPr>
-            <a:picLocks noChangeAspect="1"/>
-          </p:cNvPicPr>
-          <p:nvPr/>
-        </p:nvPicPr>
-        <p:blipFill>
-          <a:blip r:embed="rId3"/>
-          <a:stretch>
-            <a:fillRect/>
-          </a:stretch>
-        </p:blipFill>
-        <p:spPr>
-          <a:xfrm>
-            <a:off x="366348" y="2143116"/>
-            <a:ext cx="8491932" cy="1908000"/>
-          </a:xfrm>
-          <a:prstGeom prst="rect">
-            <a:avLst/>
-          </a:prstGeom>
-        </p:spPr>
-      </p:pic>
       <p:sp>
         <p:nvSpPr>
           <p:cNvPr id="10" name="Rectangle 9"/>
@@ -12715,8 +12688,8 @@
         </p:nvSpPr>
         <p:spPr>
           <a:xfrm>
-            <a:off x="285720" y="4221088"/>
-            <a:ext cx="8572560" cy="1596280"/>
+            <a:off x="244769" y="3140968"/>
+            <a:ext cx="8572560" cy="3096344"/>
           </a:xfrm>
           <a:prstGeom prst="rect">
             <a:avLst/>
@@ -12775,18 +12748,508 @@
               <a:buChar char="n"/>
             </a:pPr>
             <a:r>
-              <a:rPr lang="vi-VN" sz="3200" b="0" smtClean="0">
-                <a:latin typeface="Calibri"/>
+              <a:rPr lang="en-US" sz="2800" b="0">
+                <a:latin typeface="+mn-lt"/>
                 <a:cs typeface="+mn-cs"/>
               </a:rPr>
-              <a:t>Ước lượng tham số cho bộ phân lớp </a:t>
-            </a:r>
-            <a:r>
-              <a:rPr lang="en-US" sz="3200" b="0" smtClean="0">
-                <a:latin typeface="Calibri"/>
+              <a:t> </a:t>
+            </a:r>
+            <a:r>
+              <a:rPr lang="en-US" sz="2800" b="0" i="1">
+                <a:latin typeface="+mn-lt"/>
                 <a:cs typeface="+mn-cs"/>
               </a:rPr>
-              <a:t>Naïve Bayes</a:t>
+              <a:t>L</a:t>
+            </a:r>
+            <a:r>
+              <a:rPr lang="en-US" sz="2800" b="0" i="1" baseline="-25000">
+                <a:latin typeface="+mn-lt"/>
+                <a:cs typeface="+mn-cs"/>
+              </a:rPr>
+              <a:t>ave</a:t>
+            </a:r>
+            <a:r>
+              <a:rPr lang="en-US" sz="2800" b="0">
+                <a:latin typeface="+mn-lt"/>
+                <a:cs typeface="+mn-cs"/>
+              </a:rPr>
+              <a:t>: Đ</a:t>
+            </a:r>
+            <a:r>
+              <a:rPr lang="en-US" sz="2800" b="0" smtClean="0">
+                <a:latin typeface="+mn-lt"/>
+                <a:cs typeface="+mn-cs"/>
+              </a:rPr>
+              <a:t>ộ </a:t>
+            </a:r>
+            <a:r>
+              <a:rPr lang="en-US" sz="2800" b="0" err="1" smtClean="0">
+                <a:latin typeface="+mn-lt"/>
+                <a:cs typeface="+mn-cs"/>
+              </a:rPr>
+              <a:t>dài</a:t>
+            </a:r>
+            <a:r>
+              <a:rPr lang="en-US" sz="2800" b="0" smtClean="0">
+                <a:latin typeface="+mn-lt"/>
+                <a:cs typeface="+mn-cs"/>
+              </a:rPr>
+              <a:t> </a:t>
+            </a:r>
+            <a:r>
+              <a:rPr lang="en-US" sz="2800" b="0" err="1" smtClean="0">
+                <a:latin typeface="+mn-lt"/>
+                <a:cs typeface="+mn-cs"/>
+              </a:rPr>
+              <a:t>trung</a:t>
+            </a:r>
+            <a:r>
+              <a:rPr lang="en-US" sz="2800" b="0" smtClean="0">
+                <a:latin typeface="+mn-lt"/>
+                <a:cs typeface="+mn-cs"/>
+              </a:rPr>
+              <a:t> </a:t>
+            </a:r>
+            <a:r>
+              <a:rPr lang="en-US" sz="2800" b="0" err="1" smtClean="0">
+                <a:latin typeface="+mn-lt"/>
+                <a:cs typeface="+mn-cs"/>
+              </a:rPr>
+              <a:t>bình</a:t>
+            </a:r>
+            <a:r>
+              <a:rPr lang="en-US" sz="2800" b="0" smtClean="0">
+                <a:latin typeface="+mn-lt"/>
+                <a:cs typeface="+mn-cs"/>
+              </a:rPr>
+              <a:t> </a:t>
+            </a:r>
+            <a:r>
+              <a:rPr lang="en-US" sz="2800" b="0" err="1" smtClean="0">
+                <a:latin typeface="+mn-lt"/>
+                <a:cs typeface="+mn-cs"/>
+              </a:rPr>
+              <a:t>của</a:t>
+            </a:r>
+            <a:r>
+              <a:rPr lang="en-US" sz="2800" b="0" smtClean="0">
+                <a:latin typeface="+mn-lt"/>
+                <a:cs typeface="+mn-cs"/>
+              </a:rPr>
+              <a:t> </a:t>
+            </a:r>
+            <a:r>
+              <a:rPr lang="en-US" sz="2800" b="0" err="1" smtClean="0">
+                <a:latin typeface="+mn-lt"/>
+                <a:cs typeface="+mn-cs"/>
+              </a:rPr>
+              <a:t>văn</a:t>
+            </a:r>
+            <a:r>
+              <a:rPr lang="en-US" sz="2800" b="0" smtClean="0">
+                <a:latin typeface="+mn-lt"/>
+                <a:cs typeface="+mn-cs"/>
+              </a:rPr>
+              <a:t> </a:t>
+            </a:r>
+            <a:r>
+              <a:rPr lang="en-US" sz="2800" b="0" err="1" smtClean="0">
+                <a:latin typeface="+mn-lt"/>
+                <a:cs typeface="+mn-cs"/>
+              </a:rPr>
+              <a:t>bản</a:t>
+            </a:r>
+            <a:r>
+              <a:rPr lang="en-US" sz="2800" b="0" smtClean="0">
+                <a:latin typeface="+mn-lt"/>
+                <a:cs typeface="+mn-cs"/>
+              </a:rPr>
+              <a:t> </a:t>
+            </a:r>
+            <a:r>
+              <a:rPr lang="en-US" sz="2800" b="0" err="1" smtClean="0">
+                <a:latin typeface="+mn-lt"/>
+                <a:cs typeface="+mn-cs"/>
+              </a:rPr>
+              <a:t>luyện</a:t>
+            </a:r>
+            <a:r>
+              <a:rPr lang="en-US" sz="2800" b="0" smtClean="0">
+                <a:latin typeface="+mn-lt"/>
+                <a:cs typeface="+mn-cs"/>
+              </a:rPr>
+              <a:t>, </a:t>
+            </a:r>
+            <a:r>
+              <a:rPr lang="en-US" sz="2800" b="0" i="1">
+                <a:latin typeface="+mn-lt"/>
+                <a:cs typeface="+mn-cs"/>
+              </a:rPr>
+              <a:t>L</a:t>
+            </a:r>
+            <a:r>
+              <a:rPr lang="en-US" sz="2800" b="0" i="1" baseline="-25000">
+                <a:latin typeface="+mn-lt"/>
+                <a:cs typeface="+mn-cs"/>
+              </a:rPr>
+              <a:t>a</a:t>
+            </a:r>
+            <a:r>
+              <a:rPr lang="en-US" sz="2800" b="0">
+                <a:latin typeface="+mn-lt"/>
+                <a:cs typeface="+mn-cs"/>
+              </a:rPr>
+              <a:t>: </a:t>
+            </a:r>
+            <a:r>
+              <a:rPr lang="en-US" sz="2800" b="0" smtClean="0">
+                <a:latin typeface="+mn-lt"/>
+                <a:cs typeface="+mn-cs"/>
+              </a:rPr>
+              <a:t>Độ </a:t>
+            </a:r>
+            <a:r>
+              <a:rPr lang="en-US" sz="2800" b="0" err="1" smtClean="0">
+                <a:latin typeface="+mn-lt"/>
+                <a:cs typeface="+mn-cs"/>
+              </a:rPr>
+              <a:t>dài</a:t>
+            </a:r>
+            <a:r>
+              <a:rPr lang="en-US" sz="2800" b="0" smtClean="0">
+                <a:latin typeface="+mn-lt"/>
+                <a:cs typeface="+mn-cs"/>
+              </a:rPr>
+              <a:t> </a:t>
+            </a:r>
+            <a:r>
+              <a:rPr lang="en-US" sz="2800" b="0" err="1" smtClean="0">
+                <a:latin typeface="+mn-lt"/>
+                <a:cs typeface="+mn-cs"/>
+              </a:rPr>
+              <a:t>văn</a:t>
+            </a:r>
+            <a:r>
+              <a:rPr lang="en-US" sz="2800" b="0" smtClean="0">
+                <a:latin typeface="+mn-lt"/>
+                <a:cs typeface="+mn-cs"/>
+              </a:rPr>
+              <a:t> </a:t>
+            </a:r>
+            <a:r>
+              <a:rPr lang="en-US" sz="2800" b="0" err="1" smtClean="0">
+                <a:latin typeface="+mn-lt"/>
+                <a:cs typeface="+mn-cs"/>
+              </a:rPr>
+              <a:t>bản</a:t>
+            </a:r>
+            <a:r>
+              <a:rPr lang="en-US" sz="2800" b="0" smtClean="0">
+                <a:latin typeface="+mn-lt"/>
+                <a:cs typeface="+mn-cs"/>
+              </a:rPr>
+              <a:t> </a:t>
+            </a:r>
+            <a:r>
+              <a:rPr lang="en-US" sz="2800" b="0" err="1" smtClean="0">
+                <a:latin typeface="+mn-lt"/>
+                <a:cs typeface="+mn-cs"/>
+              </a:rPr>
+              <a:t>phân</a:t>
+            </a:r>
+            <a:r>
+              <a:rPr lang="en-US" sz="2800" b="0" smtClean="0">
+                <a:latin typeface="+mn-lt"/>
+                <a:cs typeface="+mn-cs"/>
+              </a:rPr>
+              <a:t> lớp; </a:t>
+            </a:r>
+            <a:r>
+              <a:rPr lang="en-US" sz="2800" b="0" i="1">
+                <a:latin typeface="+mn-lt"/>
+                <a:cs typeface="+mn-cs"/>
+              </a:rPr>
+              <a:t>M</a:t>
+            </a:r>
+            <a:r>
+              <a:rPr lang="en-US" sz="2800" b="0" i="1" baseline="-25000">
+                <a:latin typeface="+mn-lt"/>
+                <a:cs typeface="+mn-cs"/>
+              </a:rPr>
+              <a:t>a</a:t>
+            </a:r>
+            <a:r>
+              <a:rPr lang="en-US" sz="2800" b="0">
+                <a:latin typeface="+mn-lt"/>
+                <a:cs typeface="+mn-cs"/>
+              </a:rPr>
+              <a:t>: </a:t>
+            </a:r>
+            <a:r>
+              <a:rPr lang="en-US" sz="2800" b="0" err="1" smtClean="0">
+                <a:latin typeface="+mn-lt"/>
+                <a:cs typeface="+mn-cs"/>
+              </a:rPr>
+              <a:t>Số</a:t>
+            </a:r>
+            <a:r>
+              <a:rPr lang="en-US" sz="2800" b="0" smtClean="0">
+                <a:latin typeface="+mn-lt"/>
+                <a:cs typeface="+mn-cs"/>
+              </a:rPr>
+              <a:t> </a:t>
+            </a:r>
+            <a:r>
+              <a:rPr lang="en-US" sz="2800" b="0" err="1" smtClean="0">
+                <a:latin typeface="+mn-lt"/>
+                <a:cs typeface="+mn-cs"/>
+              </a:rPr>
+              <a:t>lượng</a:t>
+            </a:r>
+            <a:r>
+              <a:rPr lang="en-US" sz="2800" b="0" smtClean="0">
+                <a:latin typeface="+mn-lt"/>
+                <a:cs typeface="+mn-cs"/>
+              </a:rPr>
+              <a:t> </a:t>
+            </a:r>
+            <a:r>
+              <a:rPr lang="en-US" sz="2800" b="0" err="1" smtClean="0">
+                <a:latin typeface="+mn-lt"/>
+                <a:cs typeface="+mn-cs"/>
+              </a:rPr>
+              <a:t>từ</a:t>
+            </a:r>
+            <a:r>
+              <a:rPr lang="en-US" sz="2800" b="0" smtClean="0">
+                <a:latin typeface="+mn-lt"/>
+                <a:cs typeface="+mn-cs"/>
+              </a:rPr>
+              <a:t> </a:t>
+            </a:r>
+            <a:r>
+              <a:rPr lang="en-US" sz="2800" b="0" err="1" smtClean="0">
+                <a:latin typeface="+mn-lt"/>
+                <a:cs typeface="+mn-cs"/>
+              </a:rPr>
+              <a:t>duy</a:t>
+            </a:r>
+            <a:r>
+              <a:rPr lang="en-US" sz="2800" b="0" smtClean="0">
+                <a:latin typeface="+mn-lt"/>
+                <a:cs typeface="+mn-cs"/>
+              </a:rPr>
+              <a:t> </a:t>
+            </a:r>
+            <a:r>
+              <a:rPr lang="en-US" sz="2800" b="0" err="1" smtClean="0">
+                <a:latin typeface="+mn-lt"/>
+                <a:cs typeface="+mn-cs"/>
+              </a:rPr>
+              <a:t>nhất</a:t>
+            </a:r>
+            <a:r>
+              <a:rPr lang="en-US" sz="2800" b="0" smtClean="0">
+                <a:latin typeface="+mn-lt"/>
+                <a:cs typeface="+mn-cs"/>
+              </a:rPr>
+              <a:t> </a:t>
+            </a:r>
+            <a:r>
+              <a:rPr lang="en-US" sz="2800" b="0" err="1" smtClean="0">
+                <a:latin typeface="+mn-lt"/>
+                <a:cs typeface="+mn-cs"/>
+              </a:rPr>
+              <a:t>trong</a:t>
+            </a:r>
+            <a:r>
+              <a:rPr lang="en-US" sz="2800" b="0" smtClean="0">
+                <a:latin typeface="+mn-lt"/>
+                <a:cs typeface="+mn-cs"/>
+              </a:rPr>
+              <a:t> </a:t>
+            </a:r>
+            <a:r>
+              <a:rPr lang="en-US" sz="2800" b="0" err="1" smtClean="0">
+                <a:latin typeface="+mn-lt"/>
+                <a:cs typeface="+mn-cs"/>
+              </a:rPr>
+              <a:t>văn</a:t>
+            </a:r>
+            <a:r>
+              <a:rPr lang="en-US" sz="2800" b="0" smtClean="0">
+                <a:latin typeface="+mn-lt"/>
+                <a:cs typeface="+mn-cs"/>
+              </a:rPr>
+              <a:t> </a:t>
+            </a:r>
+            <a:r>
+              <a:rPr lang="en-US" sz="2800" b="0" err="1" smtClean="0">
+                <a:latin typeface="+mn-lt"/>
+                <a:cs typeface="+mn-cs"/>
+              </a:rPr>
+              <a:t>bản</a:t>
+            </a:r>
+            <a:r>
+              <a:rPr lang="en-US" sz="2800" b="0" smtClean="0">
+                <a:latin typeface="+mn-lt"/>
+                <a:cs typeface="+mn-cs"/>
+              </a:rPr>
+              <a:t> </a:t>
+            </a:r>
+            <a:r>
+              <a:rPr lang="en-US" sz="2800" b="0" err="1" smtClean="0">
+                <a:latin typeface="+mn-lt"/>
+                <a:cs typeface="+mn-cs"/>
+              </a:rPr>
+              <a:t>phân</a:t>
+            </a:r>
+            <a:r>
+              <a:rPr lang="en-US" sz="2800" b="0" smtClean="0">
+                <a:latin typeface="+mn-lt"/>
+                <a:cs typeface="+mn-cs"/>
+              </a:rPr>
+              <a:t> </a:t>
+            </a:r>
+            <a:r>
+              <a:rPr lang="en-US" sz="2800" b="0" err="1" smtClean="0">
+                <a:latin typeface="+mn-lt"/>
+                <a:cs typeface="+mn-cs"/>
+              </a:rPr>
+              <a:t>lớp</a:t>
+            </a:r>
+            <a:r>
+              <a:rPr lang="en-US" sz="2800" b="0" smtClean="0">
+                <a:latin typeface="+mn-lt"/>
+                <a:cs typeface="+mn-cs"/>
+              </a:rPr>
+              <a:t>; D </a:t>
+            </a:r>
+            <a:r>
+              <a:rPr lang="en-US" sz="2800" b="0" err="1" smtClean="0">
+                <a:latin typeface="+mn-lt"/>
+                <a:cs typeface="+mn-cs"/>
+              </a:rPr>
+              <a:t>là</a:t>
+            </a:r>
+            <a:r>
+              <a:rPr lang="en-US" sz="2800" b="0" smtClean="0">
+                <a:latin typeface="+mn-lt"/>
+                <a:cs typeface="+mn-cs"/>
+              </a:rPr>
+              <a:t> </a:t>
+            </a:r>
+            <a:r>
+              <a:rPr lang="en-US" sz="2800" b="0" err="1" smtClean="0">
+                <a:latin typeface="+mn-lt"/>
+                <a:cs typeface="+mn-cs"/>
+              </a:rPr>
+              <a:t>bộ</a:t>
+            </a:r>
+            <a:r>
+              <a:rPr lang="en-US" sz="2800" b="0" smtClean="0">
+                <a:latin typeface="+mn-lt"/>
+                <a:cs typeface="+mn-cs"/>
+              </a:rPr>
+              <a:t> </a:t>
+            </a:r>
+            <a:r>
+              <a:rPr lang="en-US" sz="2800" b="0" err="1" smtClean="0">
+                <a:latin typeface="+mn-lt"/>
+                <a:cs typeface="+mn-cs"/>
+              </a:rPr>
+              <a:t>dữ</a:t>
+            </a:r>
+            <a:r>
+              <a:rPr lang="en-US" sz="2800" b="0" smtClean="0">
+                <a:latin typeface="+mn-lt"/>
+                <a:cs typeface="+mn-cs"/>
+              </a:rPr>
+              <a:t> </a:t>
+            </a:r>
+            <a:r>
+              <a:rPr lang="en-US" sz="2800" b="0" err="1" smtClean="0">
+                <a:latin typeface="+mn-lt"/>
+                <a:cs typeface="+mn-cs"/>
+              </a:rPr>
+              <a:t>liệu</a:t>
+            </a:r>
+            <a:r>
+              <a:rPr lang="en-US" sz="2800" b="0" smtClean="0">
+                <a:latin typeface="+mn-lt"/>
+                <a:cs typeface="+mn-cs"/>
+              </a:rPr>
+              <a:t> </a:t>
+            </a:r>
+            <a:r>
+              <a:rPr lang="en-US" sz="2800" b="0" err="1" smtClean="0">
+                <a:latin typeface="+mn-lt"/>
+                <a:cs typeface="+mn-cs"/>
+              </a:rPr>
+              <a:t>luyện</a:t>
+            </a:r>
+            <a:r>
+              <a:rPr lang="en-US" sz="2800" b="0" smtClean="0">
+                <a:latin typeface="+mn-lt"/>
+                <a:cs typeface="+mn-cs"/>
+              </a:rPr>
+              <a:t>, V là bộ từ </a:t>
+            </a:r>
+            <a:r>
+              <a:rPr lang="en-US" sz="2800" b="0" err="1" smtClean="0">
+                <a:latin typeface="+mn-lt"/>
+                <a:cs typeface="+mn-cs"/>
+              </a:rPr>
+              <a:t>vựng</a:t>
+            </a:r>
+            <a:r>
+              <a:rPr lang="en-US" sz="2800" b="0" smtClean="0">
+                <a:latin typeface="+mn-lt"/>
+                <a:cs typeface="+mn-cs"/>
+              </a:rPr>
+              <a:t>; C </a:t>
+            </a:r>
+            <a:r>
+              <a:rPr lang="en-US" sz="2800" b="0" err="1" smtClean="0">
+                <a:latin typeface="+mn-lt"/>
+                <a:cs typeface="+mn-cs"/>
+              </a:rPr>
+              <a:t>là</a:t>
+            </a:r>
+            <a:r>
+              <a:rPr lang="en-US" sz="2800" b="0" smtClean="0">
+                <a:latin typeface="+mn-lt"/>
+                <a:cs typeface="+mn-cs"/>
+              </a:rPr>
+              <a:t> </a:t>
+            </a:r>
+            <a:r>
+              <a:rPr lang="en-US" sz="2800" b="0" err="1" smtClean="0">
+                <a:latin typeface="+mn-lt"/>
+                <a:cs typeface="+mn-cs"/>
+              </a:rPr>
+              <a:t>tập</a:t>
+            </a:r>
+            <a:r>
+              <a:rPr lang="en-US" sz="2800" b="0" smtClean="0">
+                <a:latin typeface="+mn-lt"/>
+                <a:cs typeface="+mn-cs"/>
+              </a:rPr>
+              <a:t> </a:t>
+            </a:r>
+            <a:r>
+              <a:rPr lang="en-US" sz="2800" b="0" err="1" smtClean="0">
+                <a:latin typeface="+mn-lt"/>
+                <a:cs typeface="+mn-cs"/>
+              </a:rPr>
+              <a:t>lớp</a:t>
+            </a:r>
+            <a:r>
+              <a:rPr lang="en-US" sz="2800" b="0" smtClean="0">
+                <a:latin typeface="+mn-lt"/>
+                <a:cs typeface="+mn-cs"/>
+              </a:rPr>
+              <a:t>.</a:t>
             </a:r>
           </a:p>
           <a:p>
@@ -12802,22 +13265,298 @@
               <a:buChar char="n"/>
             </a:pPr>
             <a:r>
-              <a:rPr lang="de-DE" sz="3200" b="0" smtClean="0">
-                <a:latin typeface="Calibri"/>
+              <a:rPr lang="en-US" sz="2800" b="0" smtClean="0">
+                <a:latin typeface="+mn-lt"/>
                 <a:cs typeface="+mn-cs"/>
               </a:rPr>
-              <a:t>Phân lớp văn bản test</a:t>
-            </a:r>
-            <a:endParaRPr lang="de-DE" sz="3200" b="0">
-              <a:latin typeface="Calibri"/>
+              <a:t>Naive </a:t>
+            </a:r>
+            <a:r>
+              <a:rPr lang="en-US" sz="2800" b="0">
+                <a:latin typeface="+mn-lt"/>
+                <a:cs typeface="+mn-cs"/>
+              </a:rPr>
+              <a:t>Bayes </a:t>
+            </a:r>
+            <a:r>
+              <a:rPr lang="en-US" sz="2800" b="0" smtClean="0">
+                <a:latin typeface="+mn-lt"/>
+                <a:cs typeface="+mn-cs"/>
+              </a:rPr>
+              <a:t>có độ </a:t>
+            </a:r>
+            <a:r>
+              <a:rPr lang="en-US" sz="2800" b="0" err="1" smtClean="0">
+                <a:latin typeface="+mn-lt"/>
+                <a:cs typeface="+mn-cs"/>
+              </a:rPr>
+              <a:t>phức</a:t>
+            </a:r>
+            <a:r>
+              <a:rPr lang="en-US" sz="2800" b="0" smtClean="0">
+                <a:latin typeface="+mn-lt"/>
+                <a:cs typeface="+mn-cs"/>
+              </a:rPr>
+              <a:t> </a:t>
+            </a:r>
+            <a:r>
+              <a:rPr lang="en-US" sz="2800" b="0" err="1" smtClean="0">
+                <a:latin typeface="+mn-lt"/>
+                <a:cs typeface="+mn-cs"/>
+              </a:rPr>
+              <a:t>tạp</a:t>
+            </a:r>
+            <a:r>
+              <a:rPr lang="en-US" sz="2800" b="0" smtClean="0">
+                <a:latin typeface="+mn-lt"/>
+                <a:cs typeface="+mn-cs"/>
+              </a:rPr>
+              <a:t> </a:t>
+            </a:r>
+            <a:r>
+              <a:rPr lang="en-US" sz="2800" b="0" err="1" smtClean="0">
+                <a:latin typeface="+mn-lt"/>
+                <a:cs typeface="+mn-cs"/>
+              </a:rPr>
+              <a:t>tuyến</a:t>
+            </a:r>
+            <a:r>
+              <a:rPr lang="en-US" sz="2800" b="0" smtClean="0">
+                <a:latin typeface="+mn-lt"/>
+                <a:cs typeface="+mn-cs"/>
+              </a:rPr>
+              <a:t> </a:t>
+            </a:r>
+            <a:r>
+              <a:rPr lang="en-US" sz="2800" b="0" err="1" smtClean="0">
+                <a:latin typeface="+mn-lt"/>
+                <a:cs typeface="+mn-cs"/>
+              </a:rPr>
+              <a:t>tính</a:t>
+            </a:r>
+            <a:r>
+              <a:rPr lang="en-US" sz="2800" b="0" smtClean="0">
+                <a:latin typeface="+mn-lt"/>
+                <a:cs typeface="+mn-cs"/>
+              </a:rPr>
+              <a:t> so </a:t>
+            </a:r>
+            <a:r>
+              <a:rPr lang="en-US" sz="2800" b="0" err="1" smtClean="0">
+                <a:latin typeface="+mn-lt"/>
+                <a:cs typeface="+mn-cs"/>
+              </a:rPr>
+              <a:t>với</a:t>
+            </a:r>
+            <a:r>
+              <a:rPr lang="en-US" sz="2800" b="0" smtClean="0">
+                <a:latin typeface="+mn-lt"/>
+                <a:cs typeface="+mn-cs"/>
+              </a:rPr>
+              <a:t> </a:t>
+            </a:r>
+            <a:r>
+              <a:rPr lang="en-US" sz="2800" b="0" err="1" smtClean="0">
+                <a:latin typeface="+mn-lt"/>
+                <a:cs typeface="+mn-cs"/>
+              </a:rPr>
+              <a:t>kích</a:t>
+            </a:r>
+            <a:r>
+              <a:rPr lang="en-US" sz="2800" b="0" smtClean="0">
+                <a:latin typeface="+mn-lt"/>
+                <a:cs typeface="+mn-cs"/>
+              </a:rPr>
+              <a:t> </a:t>
+            </a:r>
+            <a:r>
+              <a:rPr lang="en-US" sz="2800" b="0" err="1" smtClean="0">
+                <a:latin typeface="+mn-lt"/>
+                <a:cs typeface="+mn-cs"/>
+              </a:rPr>
+              <a:t>thước</a:t>
+            </a:r>
+            <a:r>
+              <a:rPr lang="en-US" sz="2800" b="0" smtClean="0">
+                <a:latin typeface="+mn-lt"/>
+                <a:cs typeface="+mn-cs"/>
+              </a:rPr>
+              <a:t> </a:t>
+            </a:r>
+            <a:r>
+              <a:rPr lang="en-US" sz="2800" b="0" err="1" smtClean="0">
+                <a:latin typeface="+mn-lt"/>
+                <a:cs typeface="+mn-cs"/>
+              </a:rPr>
+              <a:t>dữ</a:t>
+            </a:r>
+            <a:r>
+              <a:rPr lang="en-US" sz="2800" b="0" smtClean="0">
+                <a:latin typeface="+mn-lt"/>
+                <a:cs typeface="+mn-cs"/>
+              </a:rPr>
+              <a:t> </a:t>
+            </a:r>
+            <a:r>
+              <a:rPr lang="en-US" sz="2800" b="0" err="1" smtClean="0">
+                <a:latin typeface="+mn-lt"/>
+                <a:cs typeface="+mn-cs"/>
+              </a:rPr>
+              <a:t>liệu</a:t>
+            </a:r>
+            <a:r>
+              <a:rPr lang="en-US" sz="2800" b="0" smtClean="0">
+                <a:latin typeface="+mn-lt"/>
+                <a:cs typeface="+mn-cs"/>
+              </a:rPr>
+              <a:t> </a:t>
+            </a:r>
+            <a:r>
+              <a:rPr lang="en-US" sz="2800" b="0" err="1" smtClean="0">
+                <a:latin typeface="+mn-lt"/>
+                <a:cs typeface="+mn-cs"/>
+              </a:rPr>
+              <a:t>luyện</a:t>
+            </a:r>
+            <a:r>
+              <a:rPr lang="en-US" sz="2800" b="0" smtClean="0">
+                <a:latin typeface="+mn-lt"/>
+                <a:cs typeface="+mn-cs"/>
+              </a:rPr>
+              <a:t> </a:t>
+            </a:r>
+            <a:r>
+              <a:rPr lang="en-US" sz="2800" b="0" err="1" smtClean="0">
+                <a:latin typeface="+mn-lt"/>
+                <a:cs typeface="+mn-cs"/>
+              </a:rPr>
+              <a:t>và</a:t>
+            </a:r>
+            <a:r>
+              <a:rPr lang="en-US" sz="2800" b="0" smtClean="0">
+                <a:latin typeface="+mn-lt"/>
+                <a:cs typeface="+mn-cs"/>
+              </a:rPr>
+              <a:t> </a:t>
+            </a:r>
+            <a:r>
+              <a:rPr lang="en-US" sz="2800" b="0" err="1" smtClean="0">
+                <a:latin typeface="+mn-lt"/>
+                <a:cs typeface="+mn-cs"/>
+              </a:rPr>
+              <a:t>dữ</a:t>
+            </a:r>
+            <a:r>
+              <a:rPr lang="en-US" sz="2800" b="0" smtClean="0">
+                <a:latin typeface="+mn-lt"/>
+                <a:cs typeface="+mn-cs"/>
+              </a:rPr>
+              <a:t> </a:t>
+            </a:r>
+            <a:r>
+              <a:rPr lang="en-US" sz="2800" b="0" err="1" smtClean="0">
+                <a:latin typeface="+mn-lt"/>
+                <a:cs typeface="+mn-cs"/>
+              </a:rPr>
+              <a:t>liệu</a:t>
+            </a:r>
+            <a:r>
+              <a:rPr lang="en-US" sz="2800" b="0" smtClean="0">
+                <a:latin typeface="+mn-lt"/>
+                <a:cs typeface="+mn-cs"/>
+              </a:rPr>
+              <a:t> </a:t>
+            </a:r>
+            <a:r>
+              <a:rPr lang="en-US" sz="2800" b="0" err="1" smtClean="0">
+                <a:latin typeface="+mn-lt"/>
+                <a:cs typeface="+mn-cs"/>
+              </a:rPr>
+              <a:t>phân</a:t>
+            </a:r>
+            <a:r>
+              <a:rPr lang="en-US" sz="2800" b="0" smtClean="0">
+                <a:latin typeface="+mn-lt"/>
+                <a:cs typeface="+mn-cs"/>
+              </a:rPr>
+              <a:t> </a:t>
+            </a:r>
+            <a:r>
+              <a:rPr lang="en-US" sz="2800" b="0" err="1" smtClean="0">
+                <a:latin typeface="+mn-lt"/>
+                <a:cs typeface="+mn-cs"/>
+              </a:rPr>
+              <a:t>lớp</a:t>
+            </a:r>
+            <a:r>
+              <a:rPr lang="en-US" sz="2800" b="0" smtClean="0">
+                <a:latin typeface="+mn-lt"/>
+                <a:cs typeface="+mn-cs"/>
+              </a:rPr>
+              <a:t>. Đây là độ phức tạp </a:t>
+            </a:r>
+            <a:r>
+              <a:rPr lang="en-US" sz="2800" b="0" err="1" smtClean="0">
+                <a:latin typeface="+mn-lt"/>
+                <a:cs typeface="+mn-cs"/>
+              </a:rPr>
+              <a:t>tối</a:t>
+            </a:r>
+            <a:r>
+              <a:rPr lang="en-US" sz="2800" b="0" smtClean="0">
+                <a:latin typeface="+mn-lt"/>
+                <a:cs typeface="+mn-cs"/>
+              </a:rPr>
+              <a:t> </a:t>
+            </a:r>
+            <a:r>
+              <a:rPr lang="en-US" sz="2800" b="0" err="1" smtClean="0">
+                <a:latin typeface="+mn-lt"/>
+                <a:cs typeface="+mn-cs"/>
+              </a:rPr>
+              <a:t>ưu</a:t>
+            </a:r>
+            <a:r>
+              <a:rPr lang="en-US" sz="2800" b="0" smtClean="0">
+                <a:latin typeface="+mn-lt"/>
+                <a:cs typeface="+mn-cs"/>
+              </a:rPr>
+              <a:t>.</a:t>
+            </a:r>
+            <a:endParaRPr lang="de-DE" sz="2800" b="0">
+              <a:latin typeface="+mn-lt"/>
               <a:cs typeface="+mn-cs"/>
             </a:endParaRPr>
           </a:p>
         </p:txBody>
       </p:sp>
+      <p:pic>
+        <p:nvPicPr>
+          <p:cNvPr id="9" name="Picture 8" descr="13381.png"/>
+          <p:cNvPicPr>
+            <a:picLocks noChangeAspect="1"/>
+          </p:cNvPicPr>
+          <p:nvPr/>
+        </p:nvPicPr>
+        <p:blipFill>
+          <a:blip r:embed="rId3"/>
+          <a:stretch>
+            <a:fillRect/>
+          </a:stretch>
+        </p:blipFill>
+        <p:spPr>
+          <a:xfrm>
+            <a:off x="971600" y="1844824"/>
+            <a:ext cx="5416546" cy="1224000"/>
+          </a:xfrm>
+          <a:prstGeom prst="rect">
+            <a:avLst/>
+          </a:prstGeom>
+        </p:spPr>
+      </p:pic>
       <p:sp>
         <p:nvSpPr>
-          <p:cNvPr id="9" name="Slide Number Placeholder 1"/>
+          <p:cNvPr id="16" name="Slide Number Placeholder 1"/>
           <p:cNvSpPr>
             <a:spLocks noGrp="1"/>
           </p:cNvSpPr>
@@ -12852,7 +13591,7 @@
     </p:spTree>
     <p:extLst>
       <p:ext uri="{BB962C8B-B14F-4D97-AF65-F5344CB8AC3E}">
-        <p14:creationId xmlns:p14="http://schemas.microsoft.com/office/powerpoint/2010/main" val="3806642529"/>
+        <p14:creationId xmlns:p14="http://schemas.microsoft.com/office/powerpoint/2010/main" val="1372659207"/>
       </p:ext>
     </p:extLst>
   </p:cSld>
@@ -12917,8 +13656,8 @@
         </p:nvSpPr>
         <p:spPr bwMode="auto">
           <a:xfrm>
-            <a:off x="1187623" y="303213"/>
-            <a:ext cx="7629705" cy="1403350"/>
+            <a:off x="1121130" y="303213"/>
+            <a:ext cx="7742664" cy="1403350"/>
           </a:xfrm>
           <a:prstGeom prst="rect">
             <a:avLst/>
@@ -12964,11 +13703,8 @@
             </a:prstTxWarp>
           </a:bodyPr>
           <a:lstStyle>
-            <a:defPPr>
-              <a:defRPr lang="vi-VN"/>
-            </a:defPPr>
             <a:lvl1pPr eaLnBrk="1" hangingPunct="1">
-              <a:defRPr sz="3600" b="0">
+              <a:defRPr sz="3600">
                 <a:solidFill>
                   <a:schemeClr val="tx2"/>
                 </a:solidFill>
@@ -13060,18 +13796,10 @@
           </a:lstStyle>
           <a:p>
             <a:r>
-              <a:rPr lang="en-US" smtClean="0"/>
-              <a:t>Độ phức tạp của </a:t>
-            </a:r>
-            <a:r>
-              <a:rPr lang="en-US"/>
-              <a:t>Naive </a:t>
-            </a:r>
-            <a:r>
-              <a:rPr lang="en-US" err="1"/>
-              <a:t>Bayes</a:t>
-            </a:r>
-            <a:endParaRPr lang="en-US"/>
+              <a:rPr lang="vi-VN" b="0" smtClean="0"/>
+              <a:t>Ví dụ phân lớp Naive Bayes</a:t>
+            </a:r>
+            <a:endParaRPr lang="vi-VN" b="0"/>
           </a:p>
         </p:txBody>
       </p:sp>
@@ -13115,6 +13843,30 @@
           </a:p>
         </p:txBody>
       </p:sp>
+      <p:pic>
+        <p:nvPicPr>
+          <p:cNvPr id="8" name="Picture 7" descr="1335.png"/>
+          <p:cNvPicPr>
+            <a:picLocks noChangeAspect="1"/>
+          </p:cNvPicPr>
+          <p:nvPr/>
+        </p:nvPicPr>
+        <p:blipFill>
+          <a:blip r:embed="rId3"/>
+          <a:stretch>
+            <a:fillRect/>
+          </a:stretch>
+        </p:blipFill>
+        <p:spPr>
+          <a:xfrm>
+            <a:off x="366348" y="2143116"/>
+            <a:ext cx="8491932" cy="1908000"/>
+          </a:xfrm>
+          <a:prstGeom prst="rect">
+            <a:avLst/>
+          </a:prstGeom>
+        </p:spPr>
+      </p:pic>
       <p:sp>
         <p:nvSpPr>
           <p:cNvPr id="10" name="Rectangle 9"/>
@@ -13123,8 +13875,8 @@
         </p:nvSpPr>
         <p:spPr>
           <a:xfrm>
-            <a:off x="244769" y="3140968"/>
-            <a:ext cx="8572560" cy="3096344"/>
+            <a:off x="285720" y="4221088"/>
+            <a:ext cx="8572560" cy="1596280"/>
           </a:xfrm>
           <a:prstGeom prst="rect">
             <a:avLst/>
@@ -13183,508 +13935,18 @@
               <a:buChar char="n"/>
             </a:pPr>
             <a:r>
-              <a:rPr lang="en-US" sz="2800" b="0">
-                <a:latin typeface="+mn-lt"/>
+              <a:rPr lang="vi-VN" sz="3200" b="0" smtClean="0">
+                <a:latin typeface="Calibri"/>
                 <a:cs typeface="+mn-cs"/>
               </a:rPr>
-              <a:t> </a:t>
-            </a:r>
-            <a:r>
-              <a:rPr lang="en-US" sz="2800" b="0" i="1">
-                <a:latin typeface="+mn-lt"/>
+              <a:t>Ước lượng tham số cho bộ phân lớp </a:t>
+            </a:r>
+            <a:r>
+              <a:rPr lang="en-US" sz="3200" b="0" smtClean="0">
+                <a:latin typeface="Calibri"/>
                 <a:cs typeface="+mn-cs"/>
               </a:rPr>
-              <a:t>L</a:t>
-            </a:r>
-            <a:r>
-              <a:rPr lang="en-US" sz="2800" b="0" i="1" baseline="-25000">
-                <a:latin typeface="+mn-lt"/>
-                <a:cs typeface="+mn-cs"/>
-              </a:rPr>
-              <a:t>ave</a:t>
-            </a:r>
-            <a:r>
-              <a:rPr lang="en-US" sz="2800" b="0">
-                <a:latin typeface="+mn-lt"/>
-                <a:cs typeface="+mn-cs"/>
-              </a:rPr>
-              <a:t>: Đ</a:t>
-            </a:r>
-            <a:r>
-              <a:rPr lang="en-US" sz="2800" b="0" smtClean="0">
-                <a:latin typeface="+mn-lt"/>
-                <a:cs typeface="+mn-cs"/>
-              </a:rPr>
-              <a:t>ộ </a:t>
-            </a:r>
-            <a:r>
-              <a:rPr lang="en-US" sz="2800" b="0" err="1" smtClean="0">
-                <a:latin typeface="+mn-lt"/>
-                <a:cs typeface="+mn-cs"/>
-              </a:rPr>
-              <a:t>dài</a:t>
-            </a:r>
-            <a:r>
-              <a:rPr lang="en-US" sz="2800" b="0" smtClean="0">
-                <a:latin typeface="+mn-lt"/>
-                <a:cs typeface="+mn-cs"/>
-              </a:rPr>
-              <a:t> </a:t>
-            </a:r>
-            <a:r>
-              <a:rPr lang="en-US" sz="2800" b="0" err="1" smtClean="0">
-                <a:latin typeface="+mn-lt"/>
-                <a:cs typeface="+mn-cs"/>
-              </a:rPr>
-              <a:t>trung</a:t>
-            </a:r>
-            <a:r>
-              <a:rPr lang="en-US" sz="2800" b="0" smtClean="0">
-                <a:latin typeface="+mn-lt"/>
-                <a:cs typeface="+mn-cs"/>
-              </a:rPr>
-              <a:t> </a:t>
-            </a:r>
-            <a:r>
-              <a:rPr lang="en-US" sz="2800" b="0" err="1" smtClean="0">
-                <a:latin typeface="+mn-lt"/>
-                <a:cs typeface="+mn-cs"/>
-              </a:rPr>
-              <a:t>bình</a:t>
-            </a:r>
-            <a:r>
-              <a:rPr lang="en-US" sz="2800" b="0" smtClean="0">
-                <a:latin typeface="+mn-lt"/>
-                <a:cs typeface="+mn-cs"/>
-              </a:rPr>
-              <a:t> </a:t>
-            </a:r>
-            <a:r>
-              <a:rPr lang="en-US" sz="2800" b="0" err="1" smtClean="0">
-                <a:latin typeface="+mn-lt"/>
-                <a:cs typeface="+mn-cs"/>
-              </a:rPr>
-              <a:t>của</a:t>
-            </a:r>
-            <a:r>
-              <a:rPr lang="en-US" sz="2800" b="0" smtClean="0">
-                <a:latin typeface="+mn-lt"/>
-                <a:cs typeface="+mn-cs"/>
-              </a:rPr>
-              <a:t> </a:t>
-            </a:r>
-            <a:r>
-              <a:rPr lang="en-US" sz="2800" b="0" err="1" smtClean="0">
-                <a:latin typeface="+mn-lt"/>
-                <a:cs typeface="+mn-cs"/>
-              </a:rPr>
-              <a:t>văn</a:t>
-            </a:r>
-            <a:r>
-              <a:rPr lang="en-US" sz="2800" b="0" smtClean="0">
-                <a:latin typeface="+mn-lt"/>
-                <a:cs typeface="+mn-cs"/>
-              </a:rPr>
-              <a:t> </a:t>
-            </a:r>
-            <a:r>
-              <a:rPr lang="en-US" sz="2800" b="0" err="1" smtClean="0">
-                <a:latin typeface="+mn-lt"/>
-                <a:cs typeface="+mn-cs"/>
-              </a:rPr>
-              <a:t>bản</a:t>
-            </a:r>
-            <a:r>
-              <a:rPr lang="en-US" sz="2800" b="0" smtClean="0">
-                <a:latin typeface="+mn-lt"/>
-                <a:cs typeface="+mn-cs"/>
-              </a:rPr>
-              <a:t> </a:t>
-            </a:r>
-            <a:r>
-              <a:rPr lang="en-US" sz="2800" b="0" err="1" smtClean="0">
-                <a:latin typeface="+mn-lt"/>
-                <a:cs typeface="+mn-cs"/>
-              </a:rPr>
-              <a:t>luyện</a:t>
-            </a:r>
-            <a:r>
-              <a:rPr lang="en-US" sz="2800" b="0" smtClean="0">
-                <a:latin typeface="+mn-lt"/>
-                <a:cs typeface="+mn-cs"/>
-              </a:rPr>
-              <a:t>, </a:t>
-            </a:r>
-            <a:r>
-              <a:rPr lang="en-US" sz="2800" b="0" i="1">
-                <a:latin typeface="+mn-lt"/>
-                <a:cs typeface="+mn-cs"/>
-              </a:rPr>
-              <a:t>L</a:t>
-            </a:r>
-            <a:r>
-              <a:rPr lang="en-US" sz="2800" b="0" i="1" baseline="-25000">
-                <a:latin typeface="+mn-lt"/>
-                <a:cs typeface="+mn-cs"/>
-              </a:rPr>
-              <a:t>a</a:t>
-            </a:r>
-            <a:r>
-              <a:rPr lang="en-US" sz="2800" b="0">
-                <a:latin typeface="+mn-lt"/>
-                <a:cs typeface="+mn-cs"/>
-              </a:rPr>
-              <a:t>: </a:t>
-            </a:r>
-            <a:r>
-              <a:rPr lang="en-US" sz="2800" b="0" smtClean="0">
-                <a:latin typeface="+mn-lt"/>
-                <a:cs typeface="+mn-cs"/>
-              </a:rPr>
-              <a:t>Độ </a:t>
-            </a:r>
-            <a:r>
-              <a:rPr lang="en-US" sz="2800" b="0" err="1" smtClean="0">
-                <a:latin typeface="+mn-lt"/>
-                <a:cs typeface="+mn-cs"/>
-              </a:rPr>
-              <a:t>dài</a:t>
-            </a:r>
-            <a:r>
-              <a:rPr lang="en-US" sz="2800" b="0" smtClean="0">
-                <a:latin typeface="+mn-lt"/>
-                <a:cs typeface="+mn-cs"/>
-              </a:rPr>
-              <a:t> </a:t>
-            </a:r>
-            <a:r>
-              <a:rPr lang="en-US" sz="2800" b="0" err="1" smtClean="0">
-                <a:latin typeface="+mn-lt"/>
-                <a:cs typeface="+mn-cs"/>
-              </a:rPr>
-              <a:t>văn</a:t>
-            </a:r>
-            <a:r>
-              <a:rPr lang="en-US" sz="2800" b="0" smtClean="0">
-                <a:latin typeface="+mn-lt"/>
-                <a:cs typeface="+mn-cs"/>
-              </a:rPr>
-              <a:t> </a:t>
-            </a:r>
-            <a:r>
-              <a:rPr lang="en-US" sz="2800" b="0" err="1" smtClean="0">
-                <a:latin typeface="+mn-lt"/>
-                <a:cs typeface="+mn-cs"/>
-              </a:rPr>
-              <a:t>bản</a:t>
-            </a:r>
-            <a:r>
-              <a:rPr lang="en-US" sz="2800" b="0" smtClean="0">
-                <a:latin typeface="+mn-lt"/>
-                <a:cs typeface="+mn-cs"/>
-              </a:rPr>
-              <a:t> </a:t>
-            </a:r>
-            <a:r>
-              <a:rPr lang="en-US" sz="2800" b="0" err="1" smtClean="0">
-                <a:latin typeface="+mn-lt"/>
-                <a:cs typeface="+mn-cs"/>
-              </a:rPr>
-              <a:t>phân</a:t>
-            </a:r>
-            <a:r>
-              <a:rPr lang="en-US" sz="2800" b="0" smtClean="0">
-                <a:latin typeface="+mn-lt"/>
-                <a:cs typeface="+mn-cs"/>
-              </a:rPr>
-              <a:t> lớp; </a:t>
-            </a:r>
-            <a:r>
-              <a:rPr lang="en-US" sz="2800" b="0" i="1">
-                <a:latin typeface="+mn-lt"/>
-                <a:cs typeface="+mn-cs"/>
-              </a:rPr>
-              <a:t>M</a:t>
-            </a:r>
-            <a:r>
-              <a:rPr lang="en-US" sz="2800" b="0" i="1" baseline="-25000">
-                <a:latin typeface="+mn-lt"/>
-                <a:cs typeface="+mn-cs"/>
-              </a:rPr>
-              <a:t>a</a:t>
-            </a:r>
-            <a:r>
-              <a:rPr lang="en-US" sz="2800" b="0">
-                <a:latin typeface="+mn-lt"/>
-                <a:cs typeface="+mn-cs"/>
-              </a:rPr>
-              <a:t>: </a:t>
-            </a:r>
-            <a:r>
-              <a:rPr lang="en-US" sz="2800" b="0" err="1" smtClean="0">
-                <a:latin typeface="+mn-lt"/>
-                <a:cs typeface="+mn-cs"/>
-              </a:rPr>
-              <a:t>Số</a:t>
-            </a:r>
-            <a:r>
-              <a:rPr lang="en-US" sz="2800" b="0" smtClean="0">
-                <a:latin typeface="+mn-lt"/>
-                <a:cs typeface="+mn-cs"/>
-              </a:rPr>
-              <a:t> </a:t>
-            </a:r>
-            <a:r>
-              <a:rPr lang="en-US" sz="2800" b="0" err="1" smtClean="0">
-                <a:latin typeface="+mn-lt"/>
-                <a:cs typeface="+mn-cs"/>
-              </a:rPr>
-              <a:t>lượng</a:t>
-            </a:r>
-            <a:r>
-              <a:rPr lang="en-US" sz="2800" b="0" smtClean="0">
-                <a:latin typeface="+mn-lt"/>
-                <a:cs typeface="+mn-cs"/>
-              </a:rPr>
-              <a:t> </a:t>
-            </a:r>
-            <a:r>
-              <a:rPr lang="en-US" sz="2800" b="0" err="1" smtClean="0">
-                <a:latin typeface="+mn-lt"/>
-                <a:cs typeface="+mn-cs"/>
-              </a:rPr>
-              <a:t>từ</a:t>
-            </a:r>
-            <a:r>
-              <a:rPr lang="en-US" sz="2800" b="0" smtClean="0">
-                <a:latin typeface="+mn-lt"/>
-                <a:cs typeface="+mn-cs"/>
-              </a:rPr>
-              <a:t> </a:t>
-            </a:r>
-            <a:r>
-              <a:rPr lang="en-US" sz="2800" b="0" err="1" smtClean="0">
-                <a:latin typeface="+mn-lt"/>
-                <a:cs typeface="+mn-cs"/>
-              </a:rPr>
-              <a:t>duy</a:t>
-            </a:r>
-            <a:r>
-              <a:rPr lang="en-US" sz="2800" b="0" smtClean="0">
-                <a:latin typeface="+mn-lt"/>
-                <a:cs typeface="+mn-cs"/>
-              </a:rPr>
-              <a:t> </a:t>
-            </a:r>
-            <a:r>
-              <a:rPr lang="en-US" sz="2800" b="0" err="1" smtClean="0">
-                <a:latin typeface="+mn-lt"/>
-                <a:cs typeface="+mn-cs"/>
-              </a:rPr>
-              <a:t>nhất</a:t>
-            </a:r>
-            <a:r>
-              <a:rPr lang="en-US" sz="2800" b="0" smtClean="0">
-                <a:latin typeface="+mn-lt"/>
-                <a:cs typeface="+mn-cs"/>
-              </a:rPr>
-              <a:t> </a:t>
-            </a:r>
-            <a:r>
-              <a:rPr lang="en-US" sz="2800" b="0" err="1" smtClean="0">
-                <a:latin typeface="+mn-lt"/>
-                <a:cs typeface="+mn-cs"/>
-              </a:rPr>
-              <a:t>trong</a:t>
-            </a:r>
-            <a:r>
-              <a:rPr lang="en-US" sz="2800" b="0" smtClean="0">
-                <a:latin typeface="+mn-lt"/>
-                <a:cs typeface="+mn-cs"/>
-              </a:rPr>
-              <a:t> </a:t>
-            </a:r>
-            <a:r>
-              <a:rPr lang="en-US" sz="2800" b="0" err="1" smtClean="0">
-                <a:latin typeface="+mn-lt"/>
-                <a:cs typeface="+mn-cs"/>
-              </a:rPr>
-              <a:t>văn</a:t>
-            </a:r>
-            <a:r>
-              <a:rPr lang="en-US" sz="2800" b="0" smtClean="0">
-                <a:latin typeface="+mn-lt"/>
-                <a:cs typeface="+mn-cs"/>
-              </a:rPr>
-              <a:t> </a:t>
-            </a:r>
-            <a:r>
-              <a:rPr lang="en-US" sz="2800" b="0" err="1" smtClean="0">
-                <a:latin typeface="+mn-lt"/>
-                <a:cs typeface="+mn-cs"/>
-              </a:rPr>
-              <a:t>bản</a:t>
-            </a:r>
-            <a:r>
-              <a:rPr lang="en-US" sz="2800" b="0" smtClean="0">
-                <a:latin typeface="+mn-lt"/>
-                <a:cs typeface="+mn-cs"/>
-              </a:rPr>
-              <a:t> </a:t>
-            </a:r>
-            <a:r>
-              <a:rPr lang="en-US" sz="2800" b="0" err="1" smtClean="0">
-                <a:latin typeface="+mn-lt"/>
-                <a:cs typeface="+mn-cs"/>
-              </a:rPr>
-              <a:t>phân</a:t>
-            </a:r>
-            <a:r>
-              <a:rPr lang="en-US" sz="2800" b="0" smtClean="0">
-                <a:latin typeface="+mn-lt"/>
-                <a:cs typeface="+mn-cs"/>
-              </a:rPr>
-              <a:t> </a:t>
-            </a:r>
-            <a:r>
-              <a:rPr lang="en-US" sz="2800" b="0" err="1" smtClean="0">
-                <a:latin typeface="+mn-lt"/>
-                <a:cs typeface="+mn-cs"/>
-              </a:rPr>
-              <a:t>lớp</a:t>
-            </a:r>
-            <a:r>
-              <a:rPr lang="en-US" sz="2800" b="0" smtClean="0">
-                <a:latin typeface="+mn-lt"/>
-                <a:cs typeface="+mn-cs"/>
-              </a:rPr>
-              <a:t>; D </a:t>
-            </a:r>
-            <a:r>
-              <a:rPr lang="en-US" sz="2800" b="0" err="1" smtClean="0">
-                <a:latin typeface="+mn-lt"/>
-                <a:cs typeface="+mn-cs"/>
-              </a:rPr>
-              <a:t>là</a:t>
-            </a:r>
-            <a:r>
-              <a:rPr lang="en-US" sz="2800" b="0" smtClean="0">
-                <a:latin typeface="+mn-lt"/>
-                <a:cs typeface="+mn-cs"/>
-              </a:rPr>
-              <a:t> </a:t>
-            </a:r>
-            <a:r>
-              <a:rPr lang="en-US" sz="2800" b="0" err="1" smtClean="0">
-                <a:latin typeface="+mn-lt"/>
-                <a:cs typeface="+mn-cs"/>
-              </a:rPr>
-              <a:t>bộ</a:t>
-            </a:r>
-            <a:r>
-              <a:rPr lang="en-US" sz="2800" b="0" smtClean="0">
-                <a:latin typeface="+mn-lt"/>
-                <a:cs typeface="+mn-cs"/>
-              </a:rPr>
-              <a:t> </a:t>
-            </a:r>
-            <a:r>
-              <a:rPr lang="en-US" sz="2800" b="0" err="1" smtClean="0">
-                <a:latin typeface="+mn-lt"/>
-                <a:cs typeface="+mn-cs"/>
-              </a:rPr>
-              <a:t>dữ</a:t>
-            </a:r>
-            <a:r>
-              <a:rPr lang="en-US" sz="2800" b="0" smtClean="0">
-                <a:latin typeface="+mn-lt"/>
-                <a:cs typeface="+mn-cs"/>
-              </a:rPr>
-              <a:t> </a:t>
-            </a:r>
-            <a:r>
-              <a:rPr lang="en-US" sz="2800" b="0" err="1" smtClean="0">
-                <a:latin typeface="+mn-lt"/>
-                <a:cs typeface="+mn-cs"/>
-              </a:rPr>
-              <a:t>liệu</a:t>
-            </a:r>
-            <a:r>
-              <a:rPr lang="en-US" sz="2800" b="0" smtClean="0">
-                <a:latin typeface="+mn-lt"/>
-                <a:cs typeface="+mn-cs"/>
-              </a:rPr>
-              <a:t> </a:t>
-            </a:r>
-            <a:r>
-              <a:rPr lang="en-US" sz="2800" b="0" err="1" smtClean="0">
-                <a:latin typeface="+mn-lt"/>
-                <a:cs typeface="+mn-cs"/>
-              </a:rPr>
-              <a:t>luyện</a:t>
-            </a:r>
-            <a:r>
-              <a:rPr lang="en-US" sz="2800" b="0" smtClean="0">
-                <a:latin typeface="+mn-lt"/>
-                <a:cs typeface="+mn-cs"/>
-              </a:rPr>
-              <a:t>, V là bộ từ </a:t>
-            </a:r>
-            <a:r>
-              <a:rPr lang="en-US" sz="2800" b="0" err="1" smtClean="0">
-                <a:latin typeface="+mn-lt"/>
-                <a:cs typeface="+mn-cs"/>
-              </a:rPr>
-              <a:t>vựng</a:t>
-            </a:r>
-            <a:r>
-              <a:rPr lang="en-US" sz="2800" b="0" smtClean="0">
-                <a:latin typeface="+mn-lt"/>
-                <a:cs typeface="+mn-cs"/>
-              </a:rPr>
-              <a:t>; C </a:t>
-            </a:r>
-            <a:r>
-              <a:rPr lang="en-US" sz="2800" b="0" err="1" smtClean="0">
-                <a:latin typeface="+mn-lt"/>
-                <a:cs typeface="+mn-cs"/>
-              </a:rPr>
-              <a:t>là</a:t>
-            </a:r>
-            <a:r>
-              <a:rPr lang="en-US" sz="2800" b="0" smtClean="0">
-                <a:latin typeface="+mn-lt"/>
-                <a:cs typeface="+mn-cs"/>
-              </a:rPr>
-              <a:t> </a:t>
-            </a:r>
-            <a:r>
-              <a:rPr lang="en-US" sz="2800" b="0" err="1" smtClean="0">
-                <a:latin typeface="+mn-lt"/>
-                <a:cs typeface="+mn-cs"/>
-              </a:rPr>
-              <a:t>tập</a:t>
-            </a:r>
-            <a:r>
-              <a:rPr lang="en-US" sz="2800" b="0" smtClean="0">
-                <a:latin typeface="+mn-lt"/>
-                <a:cs typeface="+mn-cs"/>
-              </a:rPr>
-              <a:t> </a:t>
-            </a:r>
-            <a:r>
-              <a:rPr lang="en-US" sz="2800" b="0" err="1" smtClean="0">
-                <a:latin typeface="+mn-lt"/>
-                <a:cs typeface="+mn-cs"/>
-              </a:rPr>
-              <a:t>lớp</a:t>
-            </a:r>
-            <a:r>
-              <a:rPr lang="en-US" sz="2800" b="0" smtClean="0">
-                <a:latin typeface="+mn-lt"/>
-                <a:cs typeface="+mn-cs"/>
-              </a:rPr>
-              <a:t>.</a:t>
+              <a:t>Naïve Bayes</a:t>
             </a:r>
           </a:p>
           <a:p>
@@ -13700,298 +13962,29 @@
               <a:buChar char="n"/>
             </a:pPr>
             <a:r>
-              <a:rPr lang="en-US" sz="2800" b="0" smtClean="0">
-                <a:latin typeface="+mn-lt"/>
+              <a:rPr lang="de-DE" sz="3200" b="0" smtClean="0">
+                <a:latin typeface="Calibri"/>
                 <a:cs typeface="+mn-cs"/>
               </a:rPr>
-              <a:t>Naive </a:t>
-            </a:r>
-            <a:r>
-              <a:rPr lang="en-US" sz="2800" b="0">
-                <a:latin typeface="+mn-lt"/>
+              <a:t>Phân lớp văn bản test</a:t>
+            </a:r>
+            <a:r>
+              <a:rPr lang="vi-VN" sz="3200" b="0" smtClean="0">
+                <a:latin typeface="Calibri"/>
                 <a:cs typeface="+mn-cs"/>
               </a:rPr>
-              <a:t>Bayes </a:t>
-            </a:r>
-            <a:r>
-              <a:rPr lang="en-US" sz="2800" b="0" smtClean="0">
-                <a:latin typeface="+mn-lt"/>
-                <a:cs typeface="+mn-cs"/>
-              </a:rPr>
-              <a:t>có độ </a:t>
-            </a:r>
-            <a:r>
-              <a:rPr lang="en-US" sz="2800" b="0" err="1" smtClean="0">
-                <a:latin typeface="+mn-lt"/>
-                <a:cs typeface="+mn-cs"/>
-              </a:rPr>
-              <a:t>phức</a:t>
-            </a:r>
-            <a:r>
-              <a:rPr lang="en-US" sz="2800" b="0" smtClean="0">
-                <a:latin typeface="+mn-lt"/>
-                <a:cs typeface="+mn-cs"/>
-              </a:rPr>
-              <a:t> </a:t>
-            </a:r>
-            <a:r>
-              <a:rPr lang="en-US" sz="2800" b="0" err="1" smtClean="0">
-                <a:latin typeface="+mn-lt"/>
-                <a:cs typeface="+mn-cs"/>
-              </a:rPr>
-              <a:t>tạp</a:t>
-            </a:r>
-            <a:r>
-              <a:rPr lang="en-US" sz="2800" b="0" smtClean="0">
-                <a:latin typeface="+mn-lt"/>
-                <a:cs typeface="+mn-cs"/>
-              </a:rPr>
-              <a:t> </a:t>
-            </a:r>
-            <a:r>
-              <a:rPr lang="en-US" sz="2800" b="0" err="1" smtClean="0">
-                <a:latin typeface="+mn-lt"/>
-                <a:cs typeface="+mn-cs"/>
-              </a:rPr>
-              <a:t>tuyến</a:t>
-            </a:r>
-            <a:r>
-              <a:rPr lang="en-US" sz="2800" b="0" smtClean="0">
-                <a:latin typeface="+mn-lt"/>
-                <a:cs typeface="+mn-cs"/>
-              </a:rPr>
-              <a:t> </a:t>
-            </a:r>
-            <a:r>
-              <a:rPr lang="en-US" sz="2800" b="0" err="1" smtClean="0">
-                <a:latin typeface="+mn-lt"/>
-                <a:cs typeface="+mn-cs"/>
-              </a:rPr>
-              <a:t>tính</a:t>
-            </a:r>
-            <a:r>
-              <a:rPr lang="en-US" sz="2800" b="0" smtClean="0">
-                <a:latin typeface="+mn-lt"/>
-                <a:cs typeface="+mn-cs"/>
-              </a:rPr>
-              <a:t> so </a:t>
-            </a:r>
-            <a:r>
-              <a:rPr lang="en-US" sz="2800" b="0" err="1" smtClean="0">
-                <a:latin typeface="+mn-lt"/>
-                <a:cs typeface="+mn-cs"/>
-              </a:rPr>
-              <a:t>với</a:t>
-            </a:r>
-            <a:r>
-              <a:rPr lang="en-US" sz="2800" b="0" smtClean="0">
-                <a:latin typeface="+mn-lt"/>
-                <a:cs typeface="+mn-cs"/>
-              </a:rPr>
-              <a:t> </a:t>
-            </a:r>
-            <a:r>
-              <a:rPr lang="en-US" sz="2800" b="0" err="1" smtClean="0">
-                <a:latin typeface="+mn-lt"/>
-                <a:cs typeface="+mn-cs"/>
-              </a:rPr>
-              <a:t>kích</a:t>
-            </a:r>
-            <a:r>
-              <a:rPr lang="en-US" sz="2800" b="0" smtClean="0">
-                <a:latin typeface="+mn-lt"/>
-                <a:cs typeface="+mn-cs"/>
-              </a:rPr>
-              <a:t> </a:t>
-            </a:r>
-            <a:r>
-              <a:rPr lang="en-US" sz="2800" b="0" err="1" smtClean="0">
-                <a:latin typeface="+mn-lt"/>
-                <a:cs typeface="+mn-cs"/>
-              </a:rPr>
-              <a:t>thước</a:t>
-            </a:r>
-            <a:r>
-              <a:rPr lang="en-US" sz="2800" b="0" smtClean="0">
-                <a:latin typeface="+mn-lt"/>
-                <a:cs typeface="+mn-cs"/>
-              </a:rPr>
-              <a:t> </a:t>
-            </a:r>
-            <a:r>
-              <a:rPr lang="en-US" sz="2800" b="0" err="1" smtClean="0">
-                <a:latin typeface="+mn-lt"/>
-                <a:cs typeface="+mn-cs"/>
-              </a:rPr>
-              <a:t>dữ</a:t>
-            </a:r>
-            <a:r>
-              <a:rPr lang="en-US" sz="2800" b="0" smtClean="0">
-                <a:latin typeface="+mn-lt"/>
-                <a:cs typeface="+mn-cs"/>
-              </a:rPr>
-              <a:t> </a:t>
-            </a:r>
-            <a:r>
-              <a:rPr lang="en-US" sz="2800" b="0" err="1" smtClean="0">
-                <a:latin typeface="+mn-lt"/>
-                <a:cs typeface="+mn-cs"/>
-              </a:rPr>
-              <a:t>liệu</a:t>
-            </a:r>
-            <a:r>
-              <a:rPr lang="en-US" sz="2800" b="0" smtClean="0">
-                <a:latin typeface="+mn-lt"/>
-                <a:cs typeface="+mn-cs"/>
-              </a:rPr>
-              <a:t> </a:t>
-            </a:r>
-            <a:r>
-              <a:rPr lang="en-US" sz="2800" b="0" err="1" smtClean="0">
-                <a:latin typeface="+mn-lt"/>
-                <a:cs typeface="+mn-cs"/>
-              </a:rPr>
-              <a:t>luyện</a:t>
-            </a:r>
-            <a:r>
-              <a:rPr lang="en-US" sz="2800" b="0" smtClean="0">
-                <a:latin typeface="+mn-lt"/>
-                <a:cs typeface="+mn-cs"/>
-              </a:rPr>
-              <a:t> </a:t>
-            </a:r>
-            <a:r>
-              <a:rPr lang="en-US" sz="2800" b="0" err="1" smtClean="0">
-                <a:latin typeface="+mn-lt"/>
-                <a:cs typeface="+mn-cs"/>
-              </a:rPr>
-              <a:t>và</a:t>
-            </a:r>
-            <a:r>
-              <a:rPr lang="en-US" sz="2800" b="0" smtClean="0">
-                <a:latin typeface="+mn-lt"/>
-                <a:cs typeface="+mn-cs"/>
-              </a:rPr>
-              <a:t> </a:t>
-            </a:r>
-            <a:r>
-              <a:rPr lang="en-US" sz="2800" b="0" err="1" smtClean="0">
-                <a:latin typeface="+mn-lt"/>
-                <a:cs typeface="+mn-cs"/>
-              </a:rPr>
-              <a:t>dữ</a:t>
-            </a:r>
-            <a:r>
-              <a:rPr lang="en-US" sz="2800" b="0" smtClean="0">
-                <a:latin typeface="+mn-lt"/>
-                <a:cs typeface="+mn-cs"/>
-              </a:rPr>
-              <a:t> </a:t>
-            </a:r>
-            <a:r>
-              <a:rPr lang="en-US" sz="2800" b="0" err="1" smtClean="0">
-                <a:latin typeface="+mn-lt"/>
-                <a:cs typeface="+mn-cs"/>
-              </a:rPr>
-              <a:t>liệu</a:t>
-            </a:r>
-            <a:r>
-              <a:rPr lang="en-US" sz="2800" b="0" smtClean="0">
-                <a:latin typeface="+mn-lt"/>
-                <a:cs typeface="+mn-cs"/>
-              </a:rPr>
-              <a:t> </a:t>
-            </a:r>
-            <a:r>
-              <a:rPr lang="en-US" sz="2800" b="0" err="1" smtClean="0">
-                <a:latin typeface="+mn-lt"/>
-                <a:cs typeface="+mn-cs"/>
-              </a:rPr>
-              <a:t>phân</a:t>
-            </a:r>
-            <a:r>
-              <a:rPr lang="en-US" sz="2800" b="0" smtClean="0">
-                <a:latin typeface="+mn-lt"/>
-                <a:cs typeface="+mn-cs"/>
-              </a:rPr>
-              <a:t> </a:t>
-            </a:r>
-            <a:r>
-              <a:rPr lang="en-US" sz="2800" b="0" err="1" smtClean="0">
-                <a:latin typeface="+mn-lt"/>
-                <a:cs typeface="+mn-cs"/>
-              </a:rPr>
-              <a:t>lớp</a:t>
-            </a:r>
-            <a:r>
-              <a:rPr lang="en-US" sz="2800" b="0" smtClean="0">
-                <a:latin typeface="+mn-lt"/>
-                <a:cs typeface="+mn-cs"/>
-              </a:rPr>
-              <a:t>. Đây là độ phức tạp </a:t>
-            </a:r>
-            <a:r>
-              <a:rPr lang="en-US" sz="2800" b="0" err="1" smtClean="0">
-                <a:latin typeface="+mn-lt"/>
-                <a:cs typeface="+mn-cs"/>
-              </a:rPr>
-              <a:t>tối</a:t>
-            </a:r>
-            <a:r>
-              <a:rPr lang="en-US" sz="2800" b="0" smtClean="0">
-                <a:latin typeface="+mn-lt"/>
-                <a:cs typeface="+mn-cs"/>
-              </a:rPr>
-              <a:t> </a:t>
-            </a:r>
-            <a:r>
-              <a:rPr lang="en-US" sz="2800" b="0" err="1" smtClean="0">
-                <a:latin typeface="+mn-lt"/>
-                <a:cs typeface="+mn-cs"/>
-              </a:rPr>
-              <a:t>ưu</a:t>
-            </a:r>
-            <a:r>
-              <a:rPr lang="en-US" sz="2800" b="0" smtClean="0">
-                <a:latin typeface="+mn-lt"/>
-                <a:cs typeface="+mn-cs"/>
-              </a:rPr>
-              <a:t>.</a:t>
-            </a:r>
-            <a:endParaRPr lang="de-DE" sz="2800" b="0">
-              <a:latin typeface="+mn-lt"/>
+              <a:t> (docID = 5)</a:t>
+            </a:r>
+            <a:endParaRPr lang="de-DE" sz="3200" b="0">
+              <a:latin typeface="Calibri"/>
               <a:cs typeface="+mn-cs"/>
             </a:endParaRPr>
           </a:p>
         </p:txBody>
       </p:sp>
-      <p:pic>
-        <p:nvPicPr>
-          <p:cNvPr id="9" name="Picture 8" descr="13381.png"/>
-          <p:cNvPicPr>
-            <a:picLocks noChangeAspect="1"/>
-          </p:cNvPicPr>
-          <p:nvPr/>
-        </p:nvPicPr>
-        <p:blipFill>
-          <a:blip r:embed="rId3"/>
-          <a:stretch>
-            <a:fillRect/>
-          </a:stretch>
-        </p:blipFill>
-        <p:spPr>
-          <a:xfrm>
-            <a:off x="971600" y="1844824"/>
-            <a:ext cx="5416546" cy="1224000"/>
-          </a:xfrm>
-          <a:prstGeom prst="rect">
-            <a:avLst/>
-          </a:prstGeom>
-        </p:spPr>
-      </p:pic>
       <p:sp>
         <p:nvSpPr>
-          <p:cNvPr id="16" name="Slide Number Placeholder 1"/>
+          <p:cNvPr id="9" name="Slide Number Placeholder 1"/>
           <p:cNvSpPr>
             <a:spLocks noGrp="1"/>
           </p:cNvSpPr>
@@ -14026,7 +14019,7 @@
     </p:spTree>
     <p:extLst>
       <p:ext uri="{BB962C8B-B14F-4D97-AF65-F5344CB8AC3E}">
-        <p14:creationId xmlns:p14="http://schemas.microsoft.com/office/powerpoint/2010/main" val="1372659207"/>
+        <p14:creationId xmlns:p14="http://schemas.microsoft.com/office/powerpoint/2010/main" val="3806642529"/>
       </p:ext>
     </p:extLst>
   </p:cSld>
@@ -14234,14 +14227,12 @@
           </a:lstStyle>
           <a:p>
             <a:r>
+              <a:rPr lang="vi-VN"/>
+              <a:t>Ví dụ phân lớp Naive </a:t>
+            </a:r>
+            <a:r>
               <a:rPr lang="vi-VN" smtClean="0"/>
-              <a:t>Bài tập: </a:t>
-            </a:r>
-          </a:p>
-          <a:p>
-            <a:r>
-              <a:rPr lang="vi-VN" smtClean="0"/>
-              <a:t>Ước lượng tham số và phân lớp</a:t>
+              <a:t>Bayes (2)</a:t>
             </a:r>
             <a:endParaRPr lang="vi-VN"/>
           </a:p>
@@ -17633,7 +17624,7 @@
           <a:graphicData uri="http://schemas.openxmlformats.org/presentationml/2006/ole">
             <mc:AlternateContent xmlns:mc="http://schemas.openxmlformats.org/markup-compatibility/2006">
               <mc:Choice xmlns:v="urn:schemas-microsoft-com:vml" Requires="v">
-                <p:oleObj spid="_x0000_s1512" name="Формула" r:id="rId3" imgW="1473200" imgH="419100" progId="Equation.3">
+                <p:oleObj spid="_x0000_s1551" name="Формула" r:id="rId3" imgW="1473200" imgH="419100" progId="Equation.3">
                   <p:embed/>
                 </p:oleObj>
               </mc:Choice>
@@ -17722,7 +17713,7 @@
           <a:graphicData uri="http://schemas.openxmlformats.org/presentationml/2006/ole">
             <mc:AlternateContent xmlns:mc="http://schemas.openxmlformats.org/markup-compatibility/2006">
               <mc:Choice xmlns:v="urn:schemas-microsoft-com:vml" Requires="v">
-                <p:oleObj spid="_x0000_s1513" name="Формула" r:id="rId5" imgW="1511300" imgH="419100" progId="Equation.3">
+                <p:oleObj spid="_x0000_s1552" name="Формула" r:id="rId5" imgW="1511300" imgH="419100" progId="Equation.3">
                   <p:embed/>
                 </p:oleObj>
               </mc:Choice>
@@ -17811,7 +17802,7 @@
           <a:graphicData uri="http://schemas.openxmlformats.org/presentationml/2006/ole">
             <mc:AlternateContent xmlns:mc="http://schemas.openxmlformats.org/markup-compatibility/2006">
               <mc:Choice xmlns:v="urn:schemas-microsoft-com:vml" Requires="v">
-                <p:oleObj spid="_x0000_s1514" name="Equation" r:id="rId7" imgW="698400" imgH="393480" progId="Equation.3">
+                <p:oleObj spid="_x0000_s1553" name="Equation" r:id="rId7" imgW="698400" imgH="393480" progId="Equation.3">
                   <p:embed/>
                 </p:oleObj>
               </mc:Choice>
@@ -18511,11 +18502,7 @@
             </a:r>
             <a:r>
               <a:rPr lang="en-US" sz="4000" smtClean="0"/>
-              <a:t> </a:t>
-            </a:r>
-            <a:r>
-              <a:rPr lang="en-US" sz="4000" smtClean="0"/>
-              <a:t>14.1</a:t>
+              <a:t> 14.1</a:t>
             </a:r>
             <a:endParaRPr lang="vi-VN" sz="4000"/>
           </a:p>
@@ -18548,7 +18535,6 @@
               <a:rPr lang="vi-VN" sz="2800" smtClean="0"/>
               <a:t>Trường hợp khi mỗi văn bản trong bộ dữ liệu kiểm thử được gán đúng 1 nhãn lớp, đồng thời bộ phân lớp cũng gán đúng mỗi văn bản vào một lớp, gọi là phân lớp 1 lớp. </a:t>
             </a:r>
-            <a:endParaRPr lang="vi-VN" sz="2800" smtClean="0"/>
           </a:p>
           <a:p>
             <a:pPr marL="0" indent="0">
@@ -18556,11 +18542,7 @@
             </a:pPr>
             <a:r>
               <a:rPr lang="vi-VN" sz="2800" smtClean="0"/>
-              <a:t>Hãy </a:t>
-            </a:r>
-            <a:r>
-              <a:rPr lang="vi-VN" sz="2800" smtClean="0"/>
-              <a:t>chứng mình rằng, với phân lớp 1 lớp, tổng FP trên tất cả các lớp bằng tổng FN. Nếu lấy trung bình theo micro, thì F1 = accuracy.</a:t>
+              <a:t>Hãy chứng mình rằng, với phân lớp 1 lớp, tổng FP trên tất cả các lớp bằng tổng FN. Nếu lấy trung bình theo micro, thì F1 = accuracy.</a:t>
             </a:r>
             <a:endParaRPr lang="vi-VN" sz="2800"/>
           </a:p>
@@ -18627,9 +18609,9 @@
       </p:grpSpPr>
       <p:sp>
         <p:nvSpPr>
-          <p:cNvPr id="18434" name="Rectangle 2"/>
+          <p:cNvPr id="2" name="Title 1"/>
           <p:cNvSpPr>
-            <a:spLocks noGrp="1" noChangeArrowheads="1"/>
+            <a:spLocks noGrp="1"/>
           </p:cNvSpPr>
           <p:nvPr>
             <p:ph type="title"/>
@@ -18640,21 +18622,349 @@
           <a:bodyPr/>
           <a:lstStyle/>
           <a:p>
-            <a:pPr eaLnBrk="1" hangingPunct="1"/>
-            <a:endParaRPr lang="ru-RU" smtClean="0"/>
+            <a:r>
+              <a:rPr lang="en-US" sz="4000" err="1" smtClean="0"/>
+              <a:t>Bài</a:t>
+            </a:r>
+            <a:r>
+              <a:rPr lang="en-US" sz="4000" smtClean="0"/>
+              <a:t> </a:t>
+            </a:r>
+            <a:r>
+              <a:rPr lang="en-US" sz="4000" err="1" smtClean="0"/>
+              <a:t>tập</a:t>
+            </a:r>
+            <a:r>
+              <a:rPr lang="en-US" sz="4000" smtClean="0"/>
+              <a:t> 14.2</a:t>
+            </a:r>
+            <a:endParaRPr lang="vi-VN" sz="4000"/>
+          </a:p>
+        </p:txBody>
+      </p:sp>
+      <p:sp>
+        <p:nvSpPr>
+          <p:cNvPr id="3" name="Content Placeholder 2"/>
+          <p:cNvSpPr>
+            <a:spLocks noGrp="1"/>
+          </p:cNvSpPr>
+          <p:nvPr>
+            <p:ph idx="1"/>
+          </p:nvPr>
+        </p:nvSpPr>
+        <p:spPr>
+          <a:xfrm>
+            <a:off x="755576" y="2017713"/>
+            <a:ext cx="8199512" cy="619199"/>
+          </a:xfrm>
+        </p:spPr>
+        <p:txBody>
+          <a:bodyPr/>
+          <a:lstStyle/>
+          <a:p>
+            <a:pPr marL="0" indent="0">
+              <a:buNone/>
+            </a:pPr>
+            <a:r>
+              <a:rPr lang="vi-VN" sz="2800" smtClean="0"/>
+              <a:t>Cho bộ văn bản:</a:t>
+            </a:r>
+            <a:endParaRPr lang="vi-VN" sz="2800"/>
+          </a:p>
+        </p:txBody>
+      </p:sp>
+      <p:sp>
+        <p:nvSpPr>
+          <p:cNvPr id="4" name="Slide Number Placeholder 3"/>
+          <p:cNvSpPr>
+            <a:spLocks noGrp="1"/>
+          </p:cNvSpPr>
+          <p:nvPr>
+            <p:ph type="sldNum" sz="quarter" idx="12"/>
+          </p:nvPr>
+        </p:nvSpPr>
+        <p:spPr/>
+        <p:txBody>
+          <a:bodyPr/>
+          <a:lstStyle/>
+          <a:p>
+            <a:pPr>
+              <a:defRPr/>
+            </a:pPr>
+            <a:fld id="{18D75DDA-CB64-4086-83FF-BB38D2754AC9}" type="slidenum">
+              <a:rPr lang="vi-VN" smtClean="0"/>
+              <a:pPr>
+                <a:defRPr/>
+              </a:pPr>
+              <a:t>29</a:t>
+            </a:fld>
+            <a:endParaRPr lang="vi-VN"/>
+          </a:p>
+        </p:txBody>
+      </p:sp>
+      <p:sp>
+        <p:nvSpPr>
+          <p:cNvPr id="5" name="Content Placeholder 2"/>
+          <p:cNvSpPr txBox="1">
+            <a:spLocks/>
+          </p:cNvSpPr>
+          <p:nvPr/>
+        </p:nvSpPr>
+        <p:spPr bwMode="auto">
+          <a:xfrm>
+            <a:off x="755576" y="3789040"/>
+            <a:ext cx="8199512" cy="2376264"/>
+          </a:xfrm>
+          <a:prstGeom prst="rect">
+            <a:avLst/>
+          </a:prstGeom>
+          <a:noFill/>
+          <a:ln>
+            <a:noFill/>
+          </a:ln>
+          <a:effectLst/>
+          <a:extLst>
+            <a:ext uri="{909E8E84-426E-40DD-AFC4-6F175D3DCCD1}">
+              <a14:hiddenFill xmlns:a14="http://schemas.microsoft.com/office/drawing/2010/main">
+                <a:solidFill>
+                  <a:schemeClr val="accent1"/>
+                </a:solidFill>
+              </a14:hiddenFill>
+            </a:ext>
+            <a:ext uri="{91240B29-F687-4F45-9708-019B960494DF}">
+              <a14:hiddenLine xmlns:a14="http://schemas.microsoft.com/office/drawing/2010/main" w="9525">
+                <a:solidFill>
+                  <a:schemeClr val="tx1"/>
+                </a:solidFill>
+                <a:miter lim="800000"/>
+                <a:headEnd/>
+                <a:tailEnd/>
+              </a14:hiddenLine>
+            </a:ext>
+            <a:ext uri="{AF507438-7753-43E0-B8FC-AC1667EBCBE1}">
+              <a14:hiddenEffects xmlns:a14="http://schemas.microsoft.com/office/drawing/2010/main">
+                <a:effectLst>
+                  <a:outerShdw dist="35921" dir="2700000" algn="ctr" rotWithShape="0">
+                    <a:schemeClr val="bg2"/>
+                  </a:outerShdw>
+                </a:effectLst>
+              </a14:hiddenEffects>
+            </a:ext>
+          </a:extLst>
+        </p:spPr>
+        <p:txBody>
+          <a:bodyPr vert="horz" wrap="square" lIns="91440" tIns="45720" rIns="91440" bIns="45720" numCol="1" anchor="t" anchorCtr="0" compatLnSpc="1">
+            <a:prstTxWarp prst="textNoShape">
+              <a:avLst/>
+            </a:prstTxWarp>
+          </a:bodyPr>
+          <a:lstStyle>
+            <a:lvl1pPr marL="342900" indent="-342900" algn="l" rtl="0" eaLnBrk="0" fontAlgn="base" hangingPunct="0">
+              <a:spcBef>
+                <a:spcPct val="20000"/>
+              </a:spcBef>
+              <a:spcAft>
+                <a:spcPct val="0"/>
+              </a:spcAft>
+              <a:buClr>
+                <a:schemeClr val="folHlink"/>
+              </a:buClr>
+              <a:buSzPct val="60000"/>
+              <a:buFont typeface="Wingdings" panose="05000000000000000000" pitchFamily="2" charset="2"/>
+              <a:buChar char="n"/>
+              <a:defRPr sz="3200" kern="1200">
+                <a:solidFill>
+                  <a:schemeClr val="tx1"/>
+                </a:solidFill>
+                <a:latin typeface="+mn-lt"/>
+                <a:ea typeface="+mn-ea"/>
+                <a:cs typeface="+mn-cs"/>
+              </a:defRPr>
+            </a:lvl1pPr>
+            <a:lvl2pPr marL="742950" indent="-285750" algn="l" rtl="0" eaLnBrk="0" fontAlgn="base" hangingPunct="0">
+              <a:spcBef>
+                <a:spcPct val="20000"/>
+              </a:spcBef>
+              <a:spcAft>
+                <a:spcPct val="0"/>
+              </a:spcAft>
+              <a:buClr>
+                <a:schemeClr val="hlink"/>
+              </a:buClr>
+              <a:buSzPct val="55000"/>
+              <a:buFont typeface="Wingdings" panose="05000000000000000000" pitchFamily="2" charset="2"/>
+              <a:buChar char="n"/>
+              <a:defRPr sz="2800" kern="1200">
+                <a:solidFill>
+                  <a:schemeClr val="tx1"/>
+                </a:solidFill>
+                <a:latin typeface="+mn-lt"/>
+                <a:ea typeface="+mn-ea"/>
+                <a:cs typeface="+mn-cs"/>
+              </a:defRPr>
+            </a:lvl2pPr>
+            <a:lvl3pPr marL="1143000" indent="-228600" algn="l" rtl="0" eaLnBrk="0" fontAlgn="base" hangingPunct="0">
+              <a:spcBef>
+                <a:spcPct val="20000"/>
+              </a:spcBef>
+              <a:spcAft>
+                <a:spcPct val="0"/>
+              </a:spcAft>
+              <a:buClr>
+                <a:schemeClr val="folHlink"/>
+              </a:buClr>
+              <a:buSzPct val="50000"/>
+              <a:buFont typeface="Wingdings" panose="05000000000000000000" pitchFamily="2" charset="2"/>
+              <a:buChar char="n"/>
+              <a:defRPr sz="2400" kern="1200">
+                <a:solidFill>
+                  <a:schemeClr val="tx1"/>
+                </a:solidFill>
+                <a:latin typeface="+mn-lt"/>
+                <a:ea typeface="+mn-ea"/>
+                <a:cs typeface="+mn-cs"/>
+              </a:defRPr>
+            </a:lvl3pPr>
+            <a:lvl4pPr marL="1600200" indent="-228600" algn="l" rtl="0" eaLnBrk="0" fontAlgn="base" hangingPunct="0">
+              <a:spcBef>
+                <a:spcPct val="20000"/>
+              </a:spcBef>
+              <a:spcAft>
+                <a:spcPct val="0"/>
+              </a:spcAft>
+              <a:buClr>
+                <a:schemeClr val="accent2"/>
+              </a:buClr>
+              <a:buSzPct val="55000"/>
+              <a:buFont typeface="Wingdings" panose="05000000000000000000" pitchFamily="2" charset="2"/>
+              <a:buChar char="n"/>
+              <a:defRPr sz="2000" kern="1200">
+                <a:solidFill>
+                  <a:schemeClr val="tx1"/>
+                </a:solidFill>
+                <a:latin typeface="+mn-lt"/>
+                <a:ea typeface="+mn-ea"/>
+                <a:cs typeface="+mn-cs"/>
+              </a:defRPr>
+            </a:lvl4pPr>
+            <a:lvl5pPr marL="2057400" indent="-228600" algn="l" rtl="0" eaLnBrk="0" fontAlgn="base" hangingPunct="0">
+              <a:spcBef>
+                <a:spcPct val="20000"/>
+              </a:spcBef>
+              <a:spcAft>
+                <a:spcPct val="0"/>
+              </a:spcAft>
+              <a:buClr>
+                <a:schemeClr val="accent1"/>
+              </a:buClr>
+              <a:buSzPct val="50000"/>
+              <a:buFont typeface="Wingdings" panose="05000000000000000000" pitchFamily="2" charset="2"/>
+              <a:buChar char="n"/>
+              <a:defRPr sz="2000" kern="1200">
+                <a:solidFill>
+                  <a:schemeClr val="tx1"/>
+                </a:solidFill>
+                <a:latin typeface="+mn-lt"/>
+                <a:ea typeface="+mn-ea"/>
+                <a:cs typeface="+mn-cs"/>
+              </a:defRPr>
+            </a:lvl5pPr>
+            <a:lvl6pPr marL="2514600" indent="-228600" algn="l" defTabSz="914400" rtl="0" eaLnBrk="1" latinLnBrk="0" hangingPunct="1">
+              <a:lnSpc>
+                <a:spcPct val="90000"/>
+              </a:lnSpc>
+              <a:spcBef>
+                <a:spcPts val="500"/>
+              </a:spcBef>
+              <a:buFont typeface="Arial" panose="020B0604020202020204" pitchFamily="34" charset="0"/>
+              <a:buChar char="•"/>
+              <a:defRPr sz="1800" kern="1200">
+                <a:solidFill>
+                  <a:schemeClr val="tx1"/>
+                </a:solidFill>
+                <a:latin typeface="+mn-lt"/>
+                <a:ea typeface="+mn-ea"/>
+                <a:cs typeface="+mn-cs"/>
+              </a:defRPr>
+            </a:lvl6pPr>
+            <a:lvl7pPr marL="2971800" indent="-228600" algn="l" defTabSz="914400" rtl="0" eaLnBrk="1" latinLnBrk="0" hangingPunct="1">
+              <a:lnSpc>
+                <a:spcPct val="90000"/>
+              </a:lnSpc>
+              <a:spcBef>
+                <a:spcPts val="500"/>
+              </a:spcBef>
+              <a:buFont typeface="Arial" panose="020B0604020202020204" pitchFamily="34" charset="0"/>
+              <a:buChar char="•"/>
+              <a:defRPr sz="1800" kern="1200">
+                <a:solidFill>
+                  <a:schemeClr val="tx1"/>
+                </a:solidFill>
+                <a:latin typeface="+mn-lt"/>
+                <a:ea typeface="+mn-ea"/>
+                <a:cs typeface="+mn-cs"/>
+              </a:defRPr>
+            </a:lvl7pPr>
+            <a:lvl8pPr marL="3429000" indent="-228600" algn="l" defTabSz="914400" rtl="0" eaLnBrk="1" latinLnBrk="0" hangingPunct="1">
+              <a:lnSpc>
+                <a:spcPct val="90000"/>
+              </a:lnSpc>
+              <a:spcBef>
+                <a:spcPts val="500"/>
+              </a:spcBef>
+              <a:buFont typeface="Arial" panose="020B0604020202020204" pitchFamily="34" charset="0"/>
+              <a:buChar char="•"/>
+              <a:defRPr sz="1800" kern="1200">
+                <a:solidFill>
+                  <a:schemeClr val="tx1"/>
+                </a:solidFill>
+                <a:latin typeface="+mn-lt"/>
+                <a:ea typeface="+mn-ea"/>
+                <a:cs typeface="+mn-cs"/>
+              </a:defRPr>
+            </a:lvl8pPr>
+            <a:lvl9pPr marL="3886200" indent="-228600" algn="l" defTabSz="914400" rtl="0" eaLnBrk="1" latinLnBrk="0" hangingPunct="1">
+              <a:lnSpc>
+                <a:spcPct val="90000"/>
+              </a:lnSpc>
+              <a:spcBef>
+                <a:spcPts val="500"/>
+              </a:spcBef>
+              <a:buFont typeface="Arial" panose="020B0604020202020204" pitchFamily="34" charset="0"/>
+              <a:buChar char="•"/>
+              <a:defRPr sz="1800" kern="1200">
+                <a:solidFill>
+                  <a:schemeClr val="tx1"/>
+                </a:solidFill>
+                <a:latin typeface="+mn-lt"/>
+                <a:ea typeface="+mn-ea"/>
+                <a:cs typeface="+mn-cs"/>
+              </a:defRPr>
+            </a:lvl9pPr>
+          </a:lstStyle>
+          <a:p>
+            <a:pPr marL="0" indent="0">
+              <a:buFont typeface="Wingdings" panose="05000000000000000000" pitchFamily="2" charset="2"/>
+              <a:buNone/>
+            </a:pPr>
+            <a:r>
+              <a:rPr lang="vi-VN" sz="2800" b="0" smtClean="0"/>
+              <a:t>Hãy so sánh các biểu diễn túi từ theo mô hình đa thức và mô hình Bernoulli của những văn bản đã cho.</a:t>
+            </a:r>
+            <a:endParaRPr lang="vi-VN" sz="2800" b="0"/>
           </a:p>
         </p:txBody>
       </p:sp>
       <p:pic>
         <p:nvPicPr>
-          <p:cNvPr id="416771" name="Picture 3" descr="MC900282178[1]"/>
+          <p:cNvPr id="2050" name="Picture 2"/>
           <p:cNvPicPr>
             <a:picLocks noChangeAspect="1" noChangeArrowheads="1"/>
           </p:cNvPicPr>
           <p:nvPr/>
         </p:nvPicPr>
         <p:blipFill>
-          <a:blip r:embed="rId2" cstate="print">
+          <a:blip r:embed="rId2">
             <a:extLst>
               <a:ext uri="{28A0092B-C50C-407E-A947-70E740481C1C}">
                 <a14:useLocalDpi xmlns:a14="http://schemas.microsoft.com/office/drawing/2010/main" val="0"/>
@@ -18668,8 +18978,8 @@
         </p:blipFill>
         <p:spPr bwMode="auto">
           <a:xfrm>
-            <a:off x="2627313" y="1989138"/>
-            <a:ext cx="3565525" cy="4103687"/>
+            <a:off x="971599" y="2590800"/>
+            <a:ext cx="8080715" cy="1126232"/>
           </a:xfrm>
           <a:prstGeom prst="rect">
             <a:avLst/>
@@ -18682,14 +18992,14 @@
             <a:ext uri="{909E8E84-426E-40DD-AFC4-6F175D3DCCD1}">
               <a14:hiddenFill xmlns:a14="http://schemas.microsoft.com/office/drawing/2010/main">
                 <a:solidFill>
-                  <a:srgbClr val="FFFFFF"/>
+                  <a:schemeClr val="accent1"/>
                 </a:solidFill>
               </a14:hiddenFill>
             </a:ext>
             <a:ext uri="{91240B29-F687-4F45-9708-019B960494DF}">
               <a14:hiddenLine xmlns:a14="http://schemas.microsoft.com/office/drawing/2010/main" w="9525">
                 <a:solidFill>
-                  <a:srgbClr val="000000"/>
+                  <a:schemeClr val="tx1"/>
                 </a:solidFill>
                 <a:miter lim="800000"/>
                 <a:headEnd/>
@@ -18699,164 +19009,16 @@
           </a:extLst>
         </p:spPr>
       </p:pic>
-      <p:sp>
-        <p:nvSpPr>
-          <p:cNvPr id="2" name="Slide Number Placeholder 1"/>
-          <p:cNvSpPr>
-            <a:spLocks noGrp="1"/>
-          </p:cNvSpPr>
-          <p:nvPr>
-            <p:ph type="sldNum" sz="quarter" idx="12"/>
-          </p:nvPr>
-        </p:nvSpPr>
-        <p:spPr/>
-        <p:txBody>
-          <a:bodyPr/>
-          <a:lstStyle/>
-          <a:p>
-            <a:pPr>
-              <a:defRPr/>
-            </a:pPr>
-            <a:fld id="{5686553E-E7FE-4A97-BA93-B68733A0164C}" type="slidenum">
-              <a:rPr lang="vi-VN" smtClean="0"/>
-              <a:pPr>
-                <a:defRPr/>
-              </a:pPr>
-              <a:t>29</a:t>
-            </a:fld>
-            <a:endParaRPr lang="vi-VN"/>
-          </a:p>
-        </p:txBody>
-      </p:sp>
     </p:spTree>
+    <p:extLst>
+      <p:ext uri="{BB962C8B-B14F-4D97-AF65-F5344CB8AC3E}">
+        <p14:creationId xmlns:p14="http://schemas.microsoft.com/office/powerpoint/2010/main" val="3936744028"/>
+      </p:ext>
+    </p:extLst>
   </p:cSld>
   <p:clrMapOvr>
     <a:masterClrMapping/>
   </p:clrMapOvr>
-  <p:timing>
-    <p:tnLst>
-      <p:par>
-        <p:cTn id="1" dur="indefinite" restart="never" nodeType="tmRoot">
-          <p:childTnLst>
-            <p:seq concurrent="1" nextAc="seek">
-              <p:cTn id="2" dur="indefinite" nodeType="mainSeq">
-                <p:childTnLst>
-                  <p:par>
-                    <p:cTn id="3" fill="hold" nodeType="clickPar">
-                      <p:stCondLst>
-                        <p:cond delay="indefinite"/>
-                        <p:cond evt="onBegin" delay="0">
-                          <p:tn val="2"/>
-                        </p:cond>
-                      </p:stCondLst>
-                      <p:childTnLst>
-                        <p:par>
-                          <p:cTn id="4" fill="hold" nodeType="withGroup">
-                            <p:stCondLst>
-                              <p:cond delay="0"/>
-                            </p:stCondLst>
-                            <p:childTnLst>
-                              <p:par>
-                                <p:cTn id="5" presetID="2" presetClass="entr" presetSubtype="4" fill="hold" nodeType="withEffect">
-                                  <p:stCondLst>
-                                    <p:cond delay="0"/>
-                                  </p:stCondLst>
-                                  <p:childTnLst>
-                                    <p:set>
-                                      <p:cBhvr>
-                                        <p:cTn id="6" dur="1" fill="hold">
-                                          <p:stCondLst>
-                                            <p:cond delay="0"/>
-                                          </p:stCondLst>
-                                        </p:cTn>
-                                        <p:tgtEl>
-                                          <p:spTgt spid="416771"/>
-                                        </p:tgtEl>
-                                        <p:attrNameLst>
-                                          <p:attrName>style.visibility</p:attrName>
-                                        </p:attrNameLst>
-                                      </p:cBhvr>
-                                      <p:to>
-                                        <p:strVal val="visible"/>
-                                      </p:to>
-                                    </p:set>
-                                    <p:anim calcmode="lin" valueType="num">
-                                      <p:cBhvr additive="base">
-                                        <p:cTn id="7" dur="500" fill="hold"/>
-                                        <p:tgtEl>
-                                          <p:spTgt spid="416771"/>
-                                        </p:tgtEl>
-                                        <p:attrNameLst>
-                                          <p:attrName>ppt_x</p:attrName>
-                                        </p:attrNameLst>
-                                      </p:cBhvr>
-                                      <p:tavLst>
-                                        <p:tav tm="0">
-                                          <p:val>
-                                            <p:strVal val="#ppt_x"/>
-                                          </p:val>
-                                        </p:tav>
-                                        <p:tav tm="100000">
-                                          <p:val>
-                                            <p:strVal val="#ppt_x"/>
-                                          </p:val>
-                                        </p:tav>
-                                      </p:tavLst>
-                                    </p:anim>
-                                    <p:anim calcmode="lin" valueType="num">
-                                      <p:cBhvr additive="base">
-                                        <p:cTn id="8" dur="500" fill="hold"/>
-                                        <p:tgtEl>
-                                          <p:spTgt spid="416771"/>
-                                        </p:tgtEl>
-                                        <p:attrNameLst>
-                                          <p:attrName>ppt_y</p:attrName>
-                                        </p:attrNameLst>
-                                      </p:cBhvr>
-                                      <p:tavLst>
-                                        <p:tav tm="0">
-                                          <p:val>
-                                            <p:strVal val="1+#ppt_h/2"/>
-                                          </p:val>
-                                        </p:tav>
-                                        <p:tav tm="100000">
-                                          <p:val>
-                                            <p:strVal val="#ppt_y"/>
-                                          </p:val>
-                                        </p:tav>
-                                      </p:tavLst>
-                                    </p:anim>
-                                  </p:childTnLst>
-                                </p:cTn>
-                              </p:par>
-                            </p:childTnLst>
-                          </p:cTn>
-                        </p:par>
-                      </p:childTnLst>
-                    </p:cTn>
-                  </p:par>
-                </p:childTnLst>
-              </p:cTn>
-              <p:prevCondLst>
-                <p:cond evt="onPrev" delay="0">
-                  <p:tgtEl>
-                    <p:sldTgt/>
-                  </p:tgtEl>
-                </p:cond>
-              </p:prevCondLst>
-              <p:nextCondLst>
-                <p:cond evt="onNext" delay="0">
-                  <p:tgtEl>
-                    <p:sldTgt/>
-                  </p:tgtEl>
-                </p:cond>
-              </p:nextCondLst>
-            </p:seq>
-          </p:childTnLst>
-        </p:cTn>
-      </p:par>
-    </p:tnLst>
-  </p:timing>
 </p:sld>
 </file>
 
@@ -19412,6 +19574,397 @@
     <p:tnLst>
       <p:par>
         <p:cTn id="1" dur="indefinite" restart="never" nodeType="tmRoot"/>
+      </p:par>
+    </p:tnLst>
+  </p:timing>
+</p:sld>
+</file>
+
+<file path=ppt/slides/slide30.xml><?xml version="1.0" encoding="utf-8"?>
+<p:sld xmlns:a="http://schemas.openxmlformats.org/drawingml/2006/main" xmlns:r="http://schemas.openxmlformats.org/officeDocument/2006/relationships" xmlns:p="http://schemas.openxmlformats.org/presentationml/2006/main">
+  <p:cSld>
+    <p:spTree>
+      <p:nvGrpSpPr>
+        <p:cNvPr id="1" name=""/>
+        <p:cNvGrpSpPr/>
+        <p:nvPr/>
+      </p:nvGrpSpPr>
+      <p:grpSpPr>
+        <a:xfrm>
+          <a:off x="0" y="0"/>
+          <a:ext cx="0" cy="0"/>
+          <a:chOff x="0" y="0"/>
+          <a:chExt cx="0" cy="0"/>
+        </a:xfrm>
+      </p:grpSpPr>
+      <p:sp>
+        <p:nvSpPr>
+          <p:cNvPr id="2" name="Title 1"/>
+          <p:cNvSpPr>
+            <a:spLocks noGrp="1"/>
+          </p:cNvSpPr>
+          <p:nvPr>
+            <p:ph type="title"/>
+          </p:nvPr>
+        </p:nvSpPr>
+        <p:spPr/>
+        <p:txBody>
+          <a:bodyPr/>
+          <a:lstStyle/>
+          <a:p>
+            <a:r>
+              <a:rPr lang="en-US" sz="4000" err="1" smtClean="0"/>
+              <a:t>Bài</a:t>
+            </a:r>
+            <a:r>
+              <a:rPr lang="en-US" sz="4000" smtClean="0"/>
+              <a:t> </a:t>
+            </a:r>
+            <a:r>
+              <a:rPr lang="en-US" sz="4000" err="1" smtClean="0"/>
+              <a:t>tập</a:t>
+            </a:r>
+            <a:r>
+              <a:rPr lang="en-US" sz="4000" smtClean="0"/>
+              <a:t> 14.3</a:t>
+            </a:r>
+            <a:endParaRPr lang="vi-VN" sz="4000"/>
+          </a:p>
+        </p:txBody>
+      </p:sp>
+      <p:sp>
+        <p:nvSpPr>
+          <p:cNvPr id="3" name="Content Placeholder 2"/>
+          <p:cNvSpPr>
+            <a:spLocks noGrp="1"/>
+          </p:cNvSpPr>
+          <p:nvPr>
+            <p:ph idx="1"/>
+          </p:nvPr>
+        </p:nvSpPr>
+        <p:spPr>
+          <a:xfrm>
+            <a:off x="755576" y="2017713"/>
+            <a:ext cx="8199512" cy="4075583"/>
+          </a:xfrm>
+        </p:spPr>
+        <p:txBody>
+          <a:bodyPr/>
+          <a:lstStyle/>
+          <a:p>
+            <a:pPr marL="0" indent="0">
+              <a:buNone/>
+            </a:pPr>
+            <a:r>
+              <a:rPr lang="vi-VN" sz="2800" smtClean="0"/>
+              <a:t>Ý nghĩa của giả thuyết độc lập với vị trí là: Thông tin từ xuất hiện ở vị trí k cụ thể là không hữu ích. Hãy tìm ngoại lệ. </a:t>
+            </a:r>
+            <a:endParaRPr lang="vi-VN" sz="2800" smtClean="0"/>
+          </a:p>
+          <a:p>
+            <a:pPr marL="0" indent="0">
+              <a:buNone/>
+            </a:pPr>
+            <a:r>
+              <a:rPr lang="vi-VN" sz="2800" i="1" smtClean="0"/>
+              <a:t>Thử </a:t>
+            </a:r>
+            <a:r>
+              <a:rPr lang="vi-VN" sz="2800" i="1" smtClean="0"/>
+              <a:t>thiết lập văn bản với với cấu trúc cố định.</a:t>
+            </a:r>
+            <a:endParaRPr lang="vi-VN" sz="2800" i="1"/>
+          </a:p>
+        </p:txBody>
+      </p:sp>
+      <p:sp>
+        <p:nvSpPr>
+          <p:cNvPr id="4" name="Slide Number Placeholder 3"/>
+          <p:cNvSpPr>
+            <a:spLocks noGrp="1"/>
+          </p:cNvSpPr>
+          <p:nvPr>
+            <p:ph type="sldNum" sz="quarter" idx="12"/>
+          </p:nvPr>
+        </p:nvSpPr>
+        <p:spPr/>
+        <p:txBody>
+          <a:bodyPr/>
+          <a:lstStyle/>
+          <a:p>
+            <a:pPr>
+              <a:defRPr/>
+            </a:pPr>
+            <a:fld id="{18D75DDA-CB64-4086-83FF-BB38D2754AC9}" type="slidenum">
+              <a:rPr lang="vi-VN" smtClean="0"/>
+              <a:pPr>
+                <a:defRPr/>
+              </a:pPr>
+              <a:t>30</a:t>
+            </a:fld>
+            <a:endParaRPr lang="vi-VN"/>
+          </a:p>
+        </p:txBody>
+      </p:sp>
+    </p:spTree>
+    <p:extLst>
+      <p:ext uri="{BB962C8B-B14F-4D97-AF65-F5344CB8AC3E}">
+        <p14:creationId xmlns:p14="http://schemas.microsoft.com/office/powerpoint/2010/main" val="1060022588"/>
+      </p:ext>
+    </p:extLst>
+  </p:cSld>
+  <p:clrMapOvr>
+    <a:masterClrMapping/>
+  </p:clrMapOvr>
+</p:sld>
+</file>
+
+<file path=ppt/slides/slide31.xml><?xml version="1.0" encoding="utf-8"?>
+<p:sld xmlns:a="http://schemas.openxmlformats.org/drawingml/2006/main" xmlns:r="http://schemas.openxmlformats.org/officeDocument/2006/relationships" xmlns:p="http://schemas.openxmlformats.org/presentationml/2006/main">
+  <p:cSld>
+    <p:spTree>
+      <p:nvGrpSpPr>
+        <p:cNvPr id="1" name=""/>
+        <p:cNvGrpSpPr/>
+        <p:nvPr/>
+      </p:nvGrpSpPr>
+      <p:grpSpPr>
+        <a:xfrm>
+          <a:off x="0" y="0"/>
+          <a:ext cx="0" cy="0"/>
+          <a:chOff x="0" y="0"/>
+          <a:chExt cx="0" cy="0"/>
+        </a:xfrm>
+      </p:grpSpPr>
+      <p:sp>
+        <p:nvSpPr>
+          <p:cNvPr id="18434" name="Rectangle 2"/>
+          <p:cNvSpPr>
+            <a:spLocks noGrp="1" noChangeArrowheads="1"/>
+          </p:cNvSpPr>
+          <p:nvPr>
+            <p:ph type="title"/>
+          </p:nvPr>
+        </p:nvSpPr>
+        <p:spPr/>
+        <p:txBody>
+          <a:bodyPr/>
+          <a:lstStyle/>
+          <a:p>
+            <a:pPr eaLnBrk="1" hangingPunct="1"/>
+            <a:endParaRPr lang="ru-RU" smtClean="0"/>
+          </a:p>
+        </p:txBody>
+      </p:sp>
+      <p:pic>
+        <p:nvPicPr>
+          <p:cNvPr id="416771" name="Picture 3" descr="MC900282178[1]"/>
+          <p:cNvPicPr>
+            <a:picLocks noChangeAspect="1" noChangeArrowheads="1"/>
+          </p:cNvPicPr>
+          <p:nvPr/>
+        </p:nvPicPr>
+        <p:blipFill>
+          <a:blip r:embed="rId2" cstate="print">
+            <a:extLst>
+              <a:ext uri="{28A0092B-C50C-407E-A947-70E740481C1C}">
+                <a14:useLocalDpi xmlns:a14="http://schemas.microsoft.com/office/drawing/2010/main" val="0"/>
+              </a:ext>
+            </a:extLst>
+          </a:blip>
+          <a:srcRect/>
+          <a:stretch>
+            <a:fillRect/>
+          </a:stretch>
+        </p:blipFill>
+        <p:spPr bwMode="auto">
+          <a:xfrm>
+            <a:off x="2627313" y="1989138"/>
+            <a:ext cx="3565525" cy="4103687"/>
+          </a:xfrm>
+          <a:prstGeom prst="rect">
+            <a:avLst/>
+          </a:prstGeom>
+          <a:noFill/>
+          <a:ln>
+            <a:noFill/>
+          </a:ln>
+          <a:extLst>
+            <a:ext uri="{909E8E84-426E-40DD-AFC4-6F175D3DCCD1}">
+              <a14:hiddenFill xmlns:a14="http://schemas.microsoft.com/office/drawing/2010/main">
+                <a:solidFill>
+                  <a:srgbClr val="FFFFFF"/>
+                </a:solidFill>
+              </a14:hiddenFill>
+            </a:ext>
+            <a:ext uri="{91240B29-F687-4F45-9708-019B960494DF}">
+              <a14:hiddenLine xmlns:a14="http://schemas.microsoft.com/office/drawing/2010/main" w="9525">
+                <a:solidFill>
+                  <a:srgbClr val="000000"/>
+                </a:solidFill>
+                <a:miter lim="800000"/>
+                <a:headEnd/>
+                <a:tailEnd/>
+              </a14:hiddenLine>
+            </a:ext>
+          </a:extLst>
+        </p:spPr>
+      </p:pic>
+      <p:sp>
+        <p:nvSpPr>
+          <p:cNvPr id="2" name="Slide Number Placeholder 1"/>
+          <p:cNvSpPr>
+            <a:spLocks noGrp="1"/>
+          </p:cNvSpPr>
+          <p:nvPr>
+            <p:ph type="sldNum" sz="quarter" idx="12"/>
+          </p:nvPr>
+        </p:nvSpPr>
+        <p:spPr/>
+        <p:txBody>
+          <a:bodyPr/>
+          <a:lstStyle/>
+          <a:p>
+            <a:pPr>
+              <a:defRPr/>
+            </a:pPr>
+            <a:fld id="{5686553E-E7FE-4A97-BA93-B68733A0164C}" type="slidenum">
+              <a:rPr lang="vi-VN" smtClean="0"/>
+              <a:pPr>
+                <a:defRPr/>
+              </a:pPr>
+              <a:t>31</a:t>
+            </a:fld>
+            <a:endParaRPr lang="vi-VN"/>
+          </a:p>
+        </p:txBody>
+      </p:sp>
+    </p:spTree>
+  </p:cSld>
+  <p:clrMapOvr>
+    <a:masterClrMapping/>
+  </p:clrMapOvr>
+  <p:timing>
+    <p:tnLst>
+      <p:par>
+        <p:cTn id="1" dur="indefinite" restart="never" nodeType="tmRoot">
+          <p:childTnLst>
+            <p:seq concurrent="1" nextAc="seek">
+              <p:cTn id="2" dur="indefinite" nodeType="mainSeq">
+                <p:childTnLst>
+                  <p:par>
+                    <p:cTn id="3" fill="hold" nodeType="clickPar">
+                      <p:stCondLst>
+                        <p:cond delay="indefinite"/>
+                        <p:cond evt="onBegin" delay="0">
+                          <p:tn val="2"/>
+                        </p:cond>
+                      </p:stCondLst>
+                      <p:childTnLst>
+                        <p:par>
+                          <p:cTn id="4" fill="hold" nodeType="withGroup">
+                            <p:stCondLst>
+                              <p:cond delay="0"/>
+                            </p:stCondLst>
+                            <p:childTnLst>
+                              <p:par>
+                                <p:cTn id="5" presetID="2" presetClass="entr" presetSubtype="4" fill="hold" nodeType="withEffect">
+                                  <p:stCondLst>
+                                    <p:cond delay="0"/>
+                                  </p:stCondLst>
+                                  <p:childTnLst>
+                                    <p:set>
+                                      <p:cBhvr>
+                                        <p:cTn id="6" dur="1" fill="hold">
+                                          <p:stCondLst>
+                                            <p:cond delay="0"/>
+                                          </p:stCondLst>
+                                        </p:cTn>
+                                        <p:tgtEl>
+                                          <p:spTgt spid="416771"/>
+                                        </p:tgtEl>
+                                        <p:attrNameLst>
+                                          <p:attrName>style.visibility</p:attrName>
+                                        </p:attrNameLst>
+                                      </p:cBhvr>
+                                      <p:to>
+                                        <p:strVal val="visible"/>
+                                      </p:to>
+                                    </p:set>
+                                    <p:anim calcmode="lin" valueType="num">
+                                      <p:cBhvr additive="base">
+                                        <p:cTn id="7" dur="500" fill="hold"/>
+                                        <p:tgtEl>
+                                          <p:spTgt spid="416771"/>
+                                        </p:tgtEl>
+                                        <p:attrNameLst>
+                                          <p:attrName>ppt_x</p:attrName>
+                                        </p:attrNameLst>
+                                      </p:cBhvr>
+                                      <p:tavLst>
+                                        <p:tav tm="0">
+                                          <p:val>
+                                            <p:strVal val="#ppt_x"/>
+                                          </p:val>
+                                        </p:tav>
+                                        <p:tav tm="100000">
+                                          <p:val>
+                                            <p:strVal val="#ppt_x"/>
+                                          </p:val>
+                                        </p:tav>
+                                      </p:tavLst>
+                                    </p:anim>
+                                    <p:anim calcmode="lin" valueType="num">
+                                      <p:cBhvr additive="base">
+                                        <p:cTn id="8" dur="500" fill="hold"/>
+                                        <p:tgtEl>
+                                          <p:spTgt spid="416771"/>
+                                        </p:tgtEl>
+                                        <p:attrNameLst>
+                                          <p:attrName>ppt_y</p:attrName>
+                                        </p:attrNameLst>
+                                      </p:cBhvr>
+                                      <p:tavLst>
+                                        <p:tav tm="0">
+                                          <p:val>
+                                            <p:strVal val="1+#ppt_h/2"/>
+                                          </p:val>
+                                        </p:tav>
+                                        <p:tav tm="100000">
+                                          <p:val>
+                                            <p:strVal val="#ppt_y"/>
+                                          </p:val>
+                                        </p:tav>
+                                      </p:tavLst>
+                                    </p:anim>
+                                  </p:childTnLst>
+                                </p:cTn>
+                              </p:par>
+                            </p:childTnLst>
+                          </p:cTn>
+                        </p:par>
+                      </p:childTnLst>
+                    </p:cTn>
+                  </p:par>
+                </p:childTnLst>
+              </p:cTn>
+              <p:prevCondLst>
+                <p:cond evt="onPrev" delay="0">
+                  <p:tgtEl>
+                    <p:sldTgt/>
+                  </p:tgtEl>
+                </p:cond>
+              </p:prevCondLst>
+              <p:nextCondLst>
+                <p:cond evt="onNext" delay="0">
+                  <p:tgtEl>
+                    <p:sldTgt/>
+                  </p:tgtEl>
+                </p:cond>
+              </p:nextCondLst>
+            </p:seq>
+          </p:childTnLst>
+        </p:cTn>
       </p:par>
     </p:tnLst>
   </p:timing>

</xml_diff>